<commit_message>
re-build of Part 2
</commit_message>
<xml_diff>
--- a/presentations/9_uncert_validation/9. Uncertainty_and_Validation_Beaudette.pptx
+++ b/presentations/9_uncert_validation/9. Uncertainty_and_Validation_Beaudette.pptx
@@ -5,7 +5,7 @@
     <p:sldMasterId id="2147483660" r:id="rId1"/>
   </p:sldMasterIdLst>
   <p:notesMasterIdLst>
-    <p:notesMasterId r:id="rId36"/>
+    <p:notesMasterId r:id="rId37"/>
   </p:notesMasterIdLst>
   <p:sldIdLst>
     <p:sldId id="257" r:id="rId2"/>
@@ -16,32 +16,33 @@
     <p:sldId id="349" r:id="rId7"/>
     <p:sldId id="332" r:id="rId8"/>
     <p:sldId id="333" r:id="rId9"/>
-    <p:sldId id="347" r:id="rId10"/>
-    <p:sldId id="336" r:id="rId11"/>
-    <p:sldId id="338" r:id="rId12"/>
-    <p:sldId id="340" r:id="rId13"/>
-    <p:sldId id="337" r:id="rId14"/>
-    <p:sldId id="351" r:id="rId15"/>
-    <p:sldId id="353" r:id="rId16"/>
-    <p:sldId id="350" r:id="rId17"/>
-    <p:sldId id="352" r:id="rId18"/>
-    <p:sldId id="346" r:id="rId19"/>
-    <p:sldId id="356" r:id="rId20"/>
-    <p:sldId id="354" r:id="rId21"/>
-    <p:sldId id="334" r:id="rId22"/>
-    <p:sldId id="366" r:id="rId23"/>
-    <p:sldId id="343" r:id="rId24"/>
-    <p:sldId id="365" r:id="rId25"/>
-    <p:sldId id="357" r:id="rId26"/>
-    <p:sldId id="358" r:id="rId27"/>
-    <p:sldId id="364" r:id="rId28"/>
-    <p:sldId id="355" r:id="rId29"/>
-    <p:sldId id="362" r:id="rId30"/>
-    <p:sldId id="360" r:id="rId31"/>
-    <p:sldId id="363" r:id="rId32"/>
-    <p:sldId id="361" r:id="rId33"/>
-    <p:sldId id="317" r:id="rId34"/>
-    <p:sldId id="323" r:id="rId35"/>
+    <p:sldId id="367" r:id="rId10"/>
+    <p:sldId id="347" r:id="rId11"/>
+    <p:sldId id="336" r:id="rId12"/>
+    <p:sldId id="338" r:id="rId13"/>
+    <p:sldId id="340" r:id="rId14"/>
+    <p:sldId id="337" r:id="rId15"/>
+    <p:sldId id="351" r:id="rId16"/>
+    <p:sldId id="353" r:id="rId17"/>
+    <p:sldId id="350" r:id="rId18"/>
+    <p:sldId id="352" r:id="rId19"/>
+    <p:sldId id="346" r:id="rId20"/>
+    <p:sldId id="356" r:id="rId21"/>
+    <p:sldId id="354" r:id="rId22"/>
+    <p:sldId id="334" r:id="rId23"/>
+    <p:sldId id="366" r:id="rId24"/>
+    <p:sldId id="343" r:id="rId25"/>
+    <p:sldId id="365" r:id="rId26"/>
+    <p:sldId id="357" r:id="rId27"/>
+    <p:sldId id="358" r:id="rId28"/>
+    <p:sldId id="364" r:id="rId29"/>
+    <p:sldId id="355" r:id="rId30"/>
+    <p:sldId id="362" r:id="rId31"/>
+    <p:sldId id="360" r:id="rId32"/>
+    <p:sldId id="363" r:id="rId33"/>
+    <p:sldId id="361" r:id="rId34"/>
+    <p:sldId id="317" r:id="rId35"/>
+    <p:sldId id="323" r:id="rId36"/>
   </p:sldIdLst>
   <p:sldSz cx="9144000" cy="6858000" type="screen4x3"/>
   <p:notesSz cx="6858000" cy="9144000"/>
@@ -230,7 +231,7 @@
           <a:p>
             <a:fld id="{1FEE0D44-209F-4E48-BF47-5709A25FBC07}" type="datetimeFigureOut">
               <a:rPr lang="en-US" smtClean="0"/>
-              <a:t>5/11/2021</a:t>
+              <a:t>2/23/2022</a:t>
             </a:fld>
             <a:endParaRPr lang="en-US"/>
           </a:p>
@@ -541,6 +542,41 @@
           <a:bodyPr/>
           <a:lstStyle/>
           <a:p>
+            <a:r>
+              <a:rPr lang="en-US" b="1" dirty="0"/>
+              <a:t>TODO:</a:t>
+            </a:r>
+          </a:p>
+          <a:p>
+            <a:pPr marL="171450" indent="-171450">
+              <a:buFont typeface="Arial" panose="020B0604020202020204" pitchFamily="34" charset="0"/>
+              <a:buChar char="•"/>
+            </a:pPr>
+            <a:r>
+              <a:rPr lang="en-US" b="0" dirty="0"/>
+              <a:t>a</a:t>
+            </a:r>
+            <a:r>
+              <a:rPr lang="en-US" dirty="0"/>
+              <a:t>dd Z's latest papers / posters on the topic of errors</a:t>
+            </a:r>
+          </a:p>
+          <a:p>
+            <a:pPr marL="171450" indent="-171450">
+              <a:buFont typeface="Arial" panose="020B0604020202020204" pitchFamily="34" charset="0"/>
+              <a:buChar char="•"/>
+            </a:pPr>
+            <a:r>
+              <a:rPr lang="en-US" dirty="0"/>
+              <a:t>SOC </a:t>
+            </a:r>
+            <a:r>
+              <a:rPr lang="en-US"/>
+              <a:t>stock calculation</a:t>
+            </a:r>
+            <a:endParaRPr lang="en-US" dirty="0"/>
+          </a:p>
+          <a:p>
             <a:endParaRPr lang="en-US" dirty="0"/>
           </a:p>
         </p:txBody>
@@ -655,7 +691,7 @@
     </p:spTree>
     <p:extLst>
       <p:ext uri="{BB962C8B-B14F-4D97-AF65-F5344CB8AC3E}">
-        <p14:creationId xmlns:p14="http://schemas.microsoft.com/office/powerpoint/2010/main" val="3417546208"/>
+        <p14:creationId xmlns:p14="http://schemas.microsoft.com/office/powerpoint/2010/main" val="2127940514"/>
       </p:ext>
     </p:extLst>
   </p:cSld>
@@ -709,29 +745,6 @@
           <a:bodyPr/>
           <a:lstStyle/>
           <a:p>
-            <a:pPr marL="0" marR="0" lvl="0" indent="0" algn="l" defTabSz="914400" rtl="0" eaLnBrk="1" fontAlgn="auto" latinLnBrk="0" hangingPunct="1">
-              <a:lnSpc>
-                <a:spcPct val="100000"/>
-              </a:lnSpc>
-              <a:spcBef>
-                <a:spcPts val="0"/>
-              </a:spcBef>
-              <a:spcAft>
-                <a:spcPts val="0"/>
-              </a:spcAft>
-              <a:buClrTx/>
-              <a:buSzTx/>
-              <a:buFontTx/>
-              <a:buNone/>
-              <a:tabLst/>
-              <a:defRPr/>
-            </a:pPr>
-            <a:r>
-              <a:rPr lang="en-GB" altLang="en-US" dirty="0"/>
-              <a:t>Three internal validation techniques are shown. Split-sample means that a random split is made, resulting in e.g. a 50% development and a 50% validation sample. Cross-validation uses the same principle, but alternates the development and validation samples (e.g. 50:50 split means 2 development and test rounds; a 90:10 split 10 rounds). The most extreme variant of cross-validation is the ‘jack-knife’, where n-1 patients are used for model development, with validation on the patient who was left out. The bootstrap is however the preferred technique (see next slide).</a:t>
-            </a:r>
-          </a:p>
-          <a:p>
             <a:endParaRPr lang="en-US" dirty="0"/>
           </a:p>
         </p:txBody>
@@ -762,7 +775,7 @@
     </p:spTree>
     <p:extLst>
       <p:ext uri="{BB962C8B-B14F-4D97-AF65-F5344CB8AC3E}">
-        <p14:creationId xmlns:p14="http://schemas.microsoft.com/office/powerpoint/2010/main" val="1122900930"/>
+        <p14:creationId xmlns:p14="http://schemas.microsoft.com/office/powerpoint/2010/main" val="3417546208"/>
       </p:ext>
     </p:extLst>
   </p:cSld>
@@ -816,6 +829,29 @@
           <a:bodyPr/>
           <a:lstStyle/>
           <a:p>
+            <a:pPr marL="0" marR="0" lvl="0" indent="0" algn="l" defTabSz="914400" rtl="0" eaLnBrk="1" fontAlgn="auto" latinLnBrk="0" hangingPunct="1">
+              <a:lnSpc>
+                <a:spcPct val="100000"/>
+              </a:lnSpc>
+              <a:spcBef>
+                <a:spcPts val="0"/>
+              </a:spcBef>
+              <a:spcAft>
+                <a:spcPts val="0"/>
+              </a:spcAft>
+              <a:buClrTx/>
+              <a:buSzTx/>
+              <a:buFontTx/>
+              <a:buNone/>
+              <a:tabLst/>
+              <a:defRPr/>
+            </a:pPr>
+            <a:r>
+              <a:rPr lang="en-GB" altLang="en-US" dirty="0"/>
+              <a:t>Three internal validation techniques are shown. Split-sample means that a random split is made, resulting in e.g. a 50% development and a 50% validation sample. Cross-validation uses the same principle, but alternates the development and validation samples (e.g. 50:50 split means 2 development and test rounds; a 90:10 split 10 rounds). The most extreme variant of cross-validation is the ‘jack-knife’, where n-1 patients are used for model development, with validation on the patient who was left out. The bootstrap is however the preferred technique (see next slide).</a:t>
+            </a:r>
+          </a:p>
+          <a:p>
             <a:endParaRPr lang="en-US" dirty="0"/>
           </a:p>
         </p:txBody>
@@ -846,7 +882,7 @@
     </p:spTree>
     <p:extLst>
       <p:ext uri="{BB962C8B-B14F-4D97-AF65-F5344CB8AC3E}">
-        <p14:creationId xmlns:p14="http://schemas.microsoft.com/office/powerpoint/2010/main" val="1729379841"/>
+        <p14:creationId xmlns:p14="http://schemas.microsoft.com/office/powerpoint/2010/main" val="1122900930"/>
       </p:ext>
     </p:extLst>
   </p:cSld>
@@ -930,7 +966,7 @@
     </p:spTree>
     <p:extLst>
       <p:ext uri="{BB962C8B-B14F-4D97-AF65-F5344CB8AC3E}">
-        <p14:creationId xmlns:p14="http://schemas.microsoft.com/office/powerpoint/2010/main" val="3119576366"/>
+        <p14:creationId xmlns:p14="http://schemas.microsoft.com/office/powerpoint/2010/main" val="1729379841"/>
       </p:ext>
     </p:extLst>
   </p:cSld>
@@ -1014,7 +1050,7 @@
     </p:spTree>
     <p:extLst>
       <p:ext uri="{BB962C8B-B14F-4D97-AF65-F5344CB8AC3E}">
-        <p14:creationId xmlns:p14="http://schemas.microsoft.com/office/powerpoint/2010/main" val="1117246393"/>
+        <p14:creationId xmlns:p14="http://schemas.microsoft.com/office/powerpoint/2010/main" val="3119576366"/>
       </p:ext>
     </p:extLst>
   </p:cSld>
@@ -1098,7 +1134,7 @@
     </p:spTree>
     <p:extLst>
       <p:ext uri="{BB962C8B-B14F-4D97-AF65-F5344CB8AC3E}">
-        <p14:creationId xmlns:p14="http://schemas.microsoft.com/office/powerpoint/2010/main" val="522285589"/>
+        <p14:creationId xmlns:p14="http://schemas.microsoft.com/office/powerpoint/2010/main" val="1117246393"/>
       </p:ext>
     </p:extLst>
   </p:cSld>
@@ -1182,7 +1218,7 @@
     </p:spTree>
     <p:extLst>
       <p:ext uri="{BB962C8B-B14F-4D97-AF65-F5344CB8AC3E}">
-        <p14:creationId xmlns:p14="http://schemas.microsoft.com/office/powerpoint/2010/main" val="4105102242"/>
+        <p14:creationId xmlns:p14="http://schemas.microsoft.com/office/powerpoint/2010/main" val="522285589"/>
       </p:ext>
     </p:extLst>
   </p:cSld>
@@ -1266,7 +1302,7 @@
     </p:spTree>
     <p:extLst>
       <p:ext uri="{BB962C8B-B14F-4D97-AF65-F5344CB8AC3E}">
-        <p14:creationId xmlns:p14="http://schemas.microsoft.com/office/powerpoint/2010/main" val="1869342958"/>
+        <p14:creationId xmlns:p14="http://schemas.microsoft.com/office/powerpoint/2010/main" val="4105102242"/>
       </p:ext>
     </p:extLst>
   </p:cSld>
@@ -1350,7 +1386,7 @@
     </p:spTree>
     <p:extLst>
       <p:ext uri="{BB962C8B-B14F-4D97-AF65-F5344CB8AC3E}">
-        <p14:creationId xmlns:p14="http://schemas.microsoft.com/office/powerpoint/2010/main" val="3985200639"/>
+        <p14:creationId xmlns:p14="http://schemas.microsoft.com/office/powerpoint/2010/main" val="1869342958"/>
       </p:ext>
     </p:extLst>
   </p:cSld>
@@ -1434,7 +1470,7 @@
     </p:spTree>
     <p:extLst>
       <p:ext uri="{BB962C8B-B14F-4D97-AF65-F5344CB8AC3E}">
-        <p14:creationId xmlns:p14="http://schemas.microsoft.com/office/powerpoint/2010/main" val="2566962196"/>
+        <p14:creationId xmlns:p14="http://schemas.microsoft.com/office/powerpoint/2010/main" val="3985200639"/>
       </p:ext>
     </p:extLst>
   </p:cSld>
@@ -1602,7 +1638,7 @@
     </p:spTree>
     <p:extLst>
       <p:ext uri="{BB962C8B-B14F-4D97-AF65-F5344CB8AC3E}">
-        <p14:creationId xmlns:p14="http://schemas.microsoft.com/office/powerpoint/2010/main" val="317085200"/>
+        <p14:creationId xmlns:p14="http://schemas.microsoft.com/office/powerpoint/2010/main" val="2566962196"/>
       </p:ext>
     </p:extLst>
   </p:cSld>
@@ -1686,7 +1722,7 @@
     </p:spTree>
     <p:extLst>
       <p:ext uri="{BB962C8B-B14F-4D97-AF65-F5344CB8AC3E}">
-        <p14:creationId xmlns:p14="http://schemas.microsoft.com/office/powerpoint/2010/main" val="2536461624"/>
+        <p14:creationId xmlns:p14="http://schemas.microsoft.com/office/powerpoint/2010/main" val="317085200"/>
       </p:ext>
     </p:extLst>
   </p:cSld>
@@ -1740,10 +1776,7 @@
           <a:bodyPr/>
           <a:lstStyle/>
           <a:p>
-            <a:r>
-              <a:rPr lang="en-US" dirty="0"/>
-              <a:t>related, but not the same</a:t>
-            </a:r>
+            <a:endParaRPr lang="en-US" dirty="0"/>
           </a:p>
         </p:txBody>
       </p:sp>
@@ -1773,7 +1806,7 @@
     </p:spTree>
     <p:extLst>
       <p:ext uri="{BB962C8B-B14F-4D97-AF65-F5344CB8AC3E}">
-        <p14:creationId xmlns:p14="http://schemas.microsoft.com/office/powerpoint/2010/main" val="1124252021"/>
+        <p14:creationId xmlns:p14="http://schemas.microsoft.com/office/powerpoint/2010/main" val="2536461624"/>
       </p:ext>
     </p:extLst>
   </p:cSld>
@@ -1827,7 +1860,10 @@
           <a:bodyPr/>
           <a:lstStyle/>
           <a:p>
-            <a:endParaRPr lang="en-US" dirty="0"/>
+            <a:r>
+              <a:rPr lang="en-US" dirty="0"/>
+              <a:t>related, but not the same</a:t>
+            </a:r>
           </a:p>
         </p:txBody>
       </p:sp>
@@ -1857,7 +1893,7 @@
     </p:spTree>
     <p:extLst>
       <p:ext uri="{BB962C8B-B14F-4D97-AF65-F5344CB8AC3E}">
-        <p14:creationId xmlns:p14="http://schemas.microsoft.com/office/powerpoint/2010/main" val="2698843015"/>
+        <p14:creationId xmlns:p14="http://schemas.microsoft.com/office/powerpoint/2010/main" val="1124252021"/>
       </p:ext>
     </p:extLst>
   </p:cSld>
@@ -1941,7 +1977,7 @@
     </p:spTree>
     <p:extLst>
       <p:ext uri="{BB962C8B-B14F-4D97-AF65-F5344CB8AC3E}">
-        <p14:creationId xmlns:p14="http://schemas.microsoft.com/office/powerpoint/2010/main" val="1426037521"/>
+        <p14:creationId xmlns:p14="http://schemas.microsoft.com/office/powerpoint/2010/main" val="2698843015"/>
       </p:ext>
     </p:extLst>
   </p:cSld>
@@ -2025,7 +2061,7 @@
     </p:spTree>
     <p:extLst>
       <p:ext uri="{BB962C8B-B14F-4D97-AF65-F5344CB8AC3E}">
-        <p14:creationId xmlns:p14="http://schemas.microsoft.com/office/powerpoint/2010/main" val="215829746"/>
+        <p14:creationId xmlns:p14="http://schemas.microsoft.com/office/powerpoint/2010/main" val="1426037521"/>
       </p:ext>
     </p:extLst>
   </p:cSld>
@@ -2109,7 +2145,7 @@
     </p:spTree>
     <p:extLst>
       <p:ext uri="{BB962C8B-B14F-4D97-AF65-F5344CB8AC3E}">
-        <p14:creationId xmlns:p14="http://schemas.microsoft.com/office/powerpoint/2010/main" val="1415862704"/>
+        <p14:creationId xmlns:p14="http://schemas.microsoft.com/office/powerpoint/2010/main" val="215829746"/>
       </p:ext>
     </p:extLst>
   </p:cSld>
@@ -2193,7 +2229,7 @@
     </p:spTree>
     <p:extLst>
       <p:ext uri="{BB962C8B-B14F-4D97-AF65-F5344CB8AC3E}">
-        <p14:creationId xmlns:p14="http://schemas.microsoft.com/office/powerpoint/2010/main" val="1499160887"/>
+        <p14:creationId xmlns:p14="http://schemas.microsoft.com/office/powerpoint/2010/main" val="1415862704"/>
       </p:ext>
     </p:extLst>
   </p:cSld>
@@ -2247,10 +2283,7 @@
           <a:bodyPr/>
           <a:lstStyle/>
           <a:p>
-            <a:r>
-              <a:rPr lang="en-US" dirty="0"/>
-              <a:t>using normalized Shannon entropy</a:t>
-            </a:r>
+            <a:endParaRPr lang="en-US" dirty="0"/>
           </a:p>
         </p:txBody>
       </p:sp>
@@ -2280,7 +2313,7 @@
     </p:spTree>
     <p:extLst>
       <p:ext uri="{BB962C8B-B14F-4D97-AF65-F5344CB8AC3E}">
-        <p14:creationId xmlns:p14="http://schemas.microsoft.com/office/powerpoint/2010/main" val="3494189358"/>
+        <p14:creationId xmlns:p14="http://schemas.microsoft.com/office/powerpoint/2010/main" val="1499160887"/>
       </p:ext>
     </p:extLst>
   </p:cSld>
@@ -2334,7 +2367,10 @@
           <a:bodyPr/>
           <a:lstStyle/>
           <a:p>
-            <a:endParaRPr lang="en-US" dirty="0"/>
+            <a:r>
+              <a:rPr lang="en-US" dirty="0"/>
+              <a:t>using normalized Shannon entropy</a:t>
+            </a:r>
           </a:p>
         </p:txBody>
       </p:sp>
@@ -2364,7 +2400,7 @@
     </p:spTree>
     <p:extLst>
       <p:ext uri="{BB962C8B-B14F-4D97-AF65-F5344CB8AC3E}">
-        <p14:creationId xmlns:p14="http://schemas.microsoft.com/office/powerpoint/2010/main" val="2394130383"/>
+        <p14:creationId xmlns:p14="http://schemas.microsoft.com/office/powerpoint/2010/main" val="3494189358"/>
       </p:ext>
     </p:extLst>
   </p:cSld>
@@ -2534,14 +2570,7 @@
           <a:bodyPr/>
           <a:lstStyle/>
           <a:p>
-            <a:r>
-              <a:rPr lang="en-US" dirty="0" err="1"/>
-              <a:t>DSMorph</a:t>
-            </a:r>
-            <a:r>
-              <a:rPr lang="en-US" dirty="0"/>
-              <a:t> Book chapter 18</a:t>
-            </a:r>
+            <a:endParaRPr lang="en-US" dirty="0"/>
           </a:p>
         </p:txBody>
       </p:sp>
@@ -2571,7 +2600,7 @@
     </p:spTree>
     <p:extLst>
       <p:ext uri="{BB962C8B-B14F-4D97-AF65-F5344CB8AC3E}">
-        <p14:creationId xmlns:p14="http://schemas.microsoft.com/office/powerpoint/2010/main" val="4268769645"/>
+        <p14:creationId xmlns:p14="http://schemas.microsoft.com/office/powerpoint/2010/main" val="2394130383"/>
       </p:ext>
     </p:extLst>
   </p:cSld>
@@ -2626,8 +2655,12 @@
           <a:lstStyle/>
           <a:p>
             <a:r>
+              <a:rPr lang="en-US" dirty="0" err="1"/>
+              <a:t>DSMorph</a:t>
+            </a:r>
+            <a:r>
               <a:rPr lang="en-US" dirty="0"/>
-              <a:t>https://acsess.onlinelibrary.wiley.com/doi/10.1002/saj2.20219</a:t>
+              <a:t> Book chapter 18</a:t>
             </a:r>
           </a:p>
         </p:txBody>
@@ -2658,7 +2691,7 @@
     </p:spTree>
     <p:extLst>
       <p:ext uri="{BB962C8B-B14F-4D97-AF65-F5344CB8AC3E}">
-        <p14:creationId xmlns:p14="http://schemas.microsoft.com/office/powerpoint/2010/main" val="1356851544"/>
+        <p14:creationId xmlns:p14="http://schemas.microsoft.com/office/powerpoint/2010/main" val="4268769645"/>
       </p:ext>
     </p:extLst>
   </p:cSld>
@@ -2712,7 +2745,10 @@
           <a:bodyPr/>
           <a:lstStyle/>
           <a:p>
-            <a:endParaRPr lang="en-US" dirty="0"/>
+            <a:r>
+              <a:rPr lang="en-US" dirty="0"/>
+              <a:t>https://acsess.onlinelibrary.wiley.com/doi/10.1002/saj2.20219</a:t>
+            </a:r>
           </a:p>
         </p:txBody>
       </p:sp>
@@ -2742,7 +2778,7 @@
     </p:spTree>
     <p:extLst>
       <p:ext uri="{BB962C8B-B14F-4D97-AF65-F5344CB8AC3E}">
-        <p14:creationId xmlns:p14="http://schemas.microsoft.com/office/powerpoint/2010/main" val="3508908563"/>
+        <p14:creationId xmlns:p14="http://schemas.microsoft.com/office/powerpoint/2010/main" val="1356851544"/>
       </p:ext>
     </p:extLst>
   </p:cSld>
@@ -2826,7 +2862,7 @@
     </p:spTree>
     <p:extLst>
       <p:ext uri="{BB962C8B-B14F-4D97-AF65-F5344CB8AC3E}">
-        <p14:creationId xmlns:p14="http://schemas.microsoft.com/office/powerpoint/2010/main" val="157695685"/>
+        <p14:creationId xmlns:p14="http://schemas.microsoft.com/office/powerpoint/2010/main" val="3508908563"/>
       </p:ext>
     </p:extLst>
   </p:cSld>
@@ -2902,6 +2938,90 @@
             <a:fld id="{459BFACE-0DFB-44A8-9511-CBB7B0A920B6}" type="slidenum">
               <a:rPr lang="en-US" smtClean="0"/>
               <a:t>34</a:t>
+            </a:fld>
+            <a:endParaRPr lang="en-US"/>
+          </a:p>
+        </p:txBody>
+      </p:sp>
+    </p:spTree>
+    <p:extLst>
+      <p:ext uri="{BB962C8B-B14F-4D97-AF65-F5344CB8AC3E}">
+        <p14:creationId xmlns:p14="http://schemas.microsoft.com/office/powerpoint/2010/main" val="157695685"/>
+      </p:ext>
+    </p:extLst>
+  </p:cSld>
+  <p:clrMapOvr>
+    <a:masterClrMapping/>
+  </p:clrMapOvr>
+</p:notes>
+</file>
+
+<file path=ppt/notesSlides/notesSlide35.xml><?xml version="1.0" encoding="utf-8"?>
+<p:notes xmlns:a="http://schemas.openxmlformats.org/drawingml/2006/main" xmlns:r="http://schemas.openxmlformats.org/officeDocument/2006/relationships" xmlns:p="http://schemas.openxmlformats.org/presentationml/2006/main">
+  <p:cSld>
+    <p:spTree>
+      <p:nvGrpSpPr>
+        <p:cNvPr id="1" name=""/>
+        <p:cNvGrpSpPr/>
+        <p:nvPr/>
+      </p:nvGrpSpPr>
+      <p:grpSpPr>
+        <a:xfrm>
+          <a:off x="0" y="0"/>
+          <a:ext cx="0" cy="0"/>
+          <a:chOff x="0" y="0"/>
+          <a:chExt cx="0" cy="0"/>
+        </a:xfrm>
+      </p:grpSpPr>
+      <p:sp>
+        <p:nvSpPr>
+          <p:cNvPr id="2" name="Slide Image Placeholder 1"/>
+          <p:cNvSpPr>
+            <a:spLocks noGrp="1" noRot="1" noChangeAspect="1"/>
+          </p:cNvSpPr>
+          <p:nvPr>
+            <p:ph type="sldImg"/>
+          </p:nvPr>
+        </p:nvSpPr>
+        <p:spPr/>
+      </p:sp>
+      <p:sp>
+        <p:nvSpPr>
+          <p:cNvPr id="3" name="Notes Placeholder 2"/>
+          <p:cNvSpPr>
+            <a:spLocks noGrp="1"/>
+          </p:cNvSpPr>
+          <p:nvPr>
+            <p:ph type="body" idx="1"/>
+          </p:nvPr>
+        </p:nvSpPr>
+        <p:spPr/>
+        <p:txBody>
+          <a:bodyPr/>
+          <a:lstStyle/>
+          <a:p>
+            <a:endParaRPr lang="en-US" dirty="0"/>
+          </a:p>
+        </p:txBody>
+      </p:sp>
+      <p:sp>
+        <p:nvSpPr>
+          <p:cNvPr id="4" name="Slide Number Placeholder 3"/>
+          <p:cNvSpPr>
+            <a:spLocks noGrp="1"/>
+          </p:cNvSpPr>
+          <p:nvPr>
+            <p:ph type="sldNum" sz="quarter" idx="10"/>
+          </p:nvPr>
+        </p:nvSpPr>
+        <p:spPr/>
+        <p:txBody>
+          <a:bodyPr/>
+          <a:lstStyle/>
+          <a:p>
+            <a:fld id="{459BFACE-0DFB-44A8-9511-CBB7B0A920B6}" type="slidenum">
+              <a:rPr lang="en-US" smtClean="0"/>
+              <a:t>35</a:t>
             </a:fld>
             <a:endParaRPr lang="en-US"/>
           </a:p>
@@ -3541,7 +3661,26 @@
           <a:bodyPr/>
           <a:lstStyle/>
           <a:p>
-            <a:endParaRPr lang="en-US" dirty="0"/>
+            <a:r>
+              <a:rPr lang="en-US" dirty="0"/>
+              <a:t>TODO: demonstrate adjusting </a:t>
+            </a:r>
+            <a:r>
+              <a:rPr lang="en-US" dirty="0" err="1"/>
+              <a:t>nodesize</a:t>
+            </a:r>
+            <a:r>
+              <a:rPr lang="en-US" dirty="0"/>
+              <a:t> argument to </a:t>
+            </a:r>
+            <a:r>
+              <a:rPr lang="en-US" dirty="0" err="1"/>
+              <a:t>randomForest</a:t>
+            </a:r>
+            <a:r>
+              <a:rPr lang="en-US" dirty="0"/>
+              <a:t>()</a:t>
+            </a:r>
           </a:p>
         </p:txBody>
       </p:sp>
@@ -3571,7 +3710,7 @@
     </p:spTree>
     <p:extLst>
       <p:ext uri="{BB962C8B-B14F-4D97-AF65-F5344CB8AC3E}">
-        <p14:creationId xmlns:p14="http://schemas.microsoft.com/office/powerpoint/2010/main" val="2127940514"/>
+        <p14:creationId xmlns:p14="http://schemas.microsoft.com/office/powerpoint/2010/main" val="1911420119"/>
       </p:ext>
     </p:extLst>
   </p:cSld>
@@ -3712,7 +3851,7 @@
           <a:p>
             <a:fld id="{ED142E25-4D6A-4E84-A843-638D116E87AA}" type="datetimeFigureOut">
               <a:rPr lang="en-US" smtClean="0"/>
-              <a:t>5/11/2021</a:t>
+              <a:t>2/23/2022</a:t>
             </a:fld>
             <a:endParaRPr lang="en-US"/>
           </a:p>
@@ -3882,7 +4021,7 @@
           <a:p>
             <a:fld id="{ED142E25-4D6A-4E84-A843-638D116E87AA}" type="datetimeFigureOut">
               <a:rPr lang="en-US" smtClean="0"/>
-              <a:t>5/11/2021</a:t>
+              <a:t>2/23/2022</a:t>
             </a:fld>
             <a:endParaRPr lang="en-US"/>
           </a:p>
@@ -4062,7 +4201,7 @@
           <a:p>
             <a:fld id="{ED142E25-4D6A-4E84-A843-638D116E87AA}" type="datetimeFigureOut">
               <a:rPr lang="en-US" smtClean="0"/>
-              <a:t>5/11/2021</a:t>
+              <a:t>2/23/2022</a:t>
             </a:fld>
             <a:endParaRPr lang="en-US"/>
           </a:p>
@@ -4232,7 +4371,7 @@
           <a:p>
             <a:fld id="{ED142E25-4D6A-4E84-A843-638D116E87AA}" type="datetimeFigureOut">
               <a:rPr lang="en-US" smtClean="0"/>
-              <a:t>5/11/2021</a:t>
+              <a:t>2/23/2022</a:t>
             </a:fld>
             <a:endParaRPr lang="en-US"/>
           </a:p>
@@ -4476,7 +4615,7 @@
           <a:p>
             <a:fld id="{ED142E25-4D6A-4E84-A843-638D116E87AA}" type="datetimeFigureOut">
               <a:rPr lang="en-US" smtClean="0"/>
-              <a:t>5/11/2021</a:t>
+              <a:t>2/23/2022</a:t>
             </a:fld>
             <a:endParaRPr lang="en-US"/>
           </a:p>
@@ -4708,7 +4847,7 @@
           <a:p>
             <a:fld id="{ED142E25-4D6A-4E84-A843-638D116E87AA}" type="datetimeFigureOut">
               <a:rPr lang="en-US" smtClean="0"/>
-              <a:t>5/11/2021</a:t>
+              <a:t>2/23/2022</a:t>
             </a:fld>
             <a:endParaRPr lang="en-US"/>
           </a:p>
@@ -5075,7 +5214,7 @@
           <a:p>
             <a:fld id="{ED142E25-4D6A-4E84-A843-638D116E87AA}" type="datetimeFigureOut">
               <a:rPr lang="en-US" smtClean="0"/>
-              <a:t>5/11/2021</a:t>
+              <a:t>2/23/2022</a:t>
             </a:fld>
             <a:endParaRPr lang="en-US"/>
           </a:p>
@@ -5193,7 +5332,7 @@
           <a:p>
             <a:fld id="{ED142E25-4D6A-4E84-A843-638D116E87AA}" type="datetimeFigureOut">
               <a:rPr lang="en-US" smtClean="0"/>
-              <a:t>5/11/2021</a:t>
+              <a:t>2/23/2022</a:t>
             </a:fld>
             <a:endParaRPr lang="en-US"/>
           </a:p>
@@ -5288,7 +5427,7 @@
           <a:p>
             <a:fld id="{ED142E25-4D6A-4E84-A843-638D116E87AA}" type="datetimeFigureOut">
               <a:rPr lang="en-US" smtClean="0"/>
-              <a:t>5/11/2021</a:t>
+              <a:t>2/23/2022</a:t>
             </a:fld>
             <a:endParaRPr lang="en-US"/>
           </a:p>
@@ -5565,7 +5704,7 @@
           <a:p>
             <a:fld id="{ED142E25-4D6A-4E84-A843-638D116E87AA}" type="datetimeFigureOut">
               <a:rPr lang="en-US" smtClean="0"/>
-              <a:t>5/11/2021</a:t>
+              <a:t>2/23/2022</a:t>
             </a:fld>
             <a:endParaRPr lang="en-US"/>
           </a:p>
@@ -5822,7 +5961,7 @@
           <a:p>
             <a:fld id="{ED142E25-4D6A-4E84-A843-638D116E87AA}" type="datetimeFigureOut">
               <a:rPr lang="en-US" smtClean="0"/>
-              <a:t>5/11/2021</a:t>
+              <a:t>2/23/2022</a:t>
             </a:fld>
             <a:endParaRPr lang="en-US"/>
           </a:p>
@@ -6035,7 +6174,7 @@
           <a:p>
             <a:fld id="{ED142E25-4D6A-4E84-A843-638D116E87AA}" type="datetimeFigureOut">
               <a:rPr lang="en-US" smtClean="0"/>
-              <a:t>5/11/2021</a:t>
+              <a:t>2/23/2022</a:t>
             </a:fld>
             <a:endParaRPr lang="en-US"/>
           </a:p>
@@ -6681,6 +6820,183 @@
       </p:grpSpPr>
       <p:sp>
         <p:nvSpPr>
+          <p:cNvPr id="2" name="TextBox 1">
+            <a:extLst>
+              <a:ext uri="{FF2B5EF4-FFF2-40B4-BE49-F238E27FC236}">
+                <a16:creationId xmlns:a16="http://schemas.microsoft.com/office/drawing/2014/main" id="{8620DD9E-4B2E-4CAF-904E-2C385416DD9B}"/>
+              </a:ext>
+            </a:extLst>
+          </p:cNvPr>
+          <p:cNvSpPr txBox="1"/>
+          <p:nvPr/>
+        </p:nvSpPr>
+        <p:spPr>
+          <a:xfrm>
+            <a:off x="9525" y="-38784"/>
+            <a:ext cx="5769336" cy="646331"/>
+          </a:xfrm>
+          <a:prstGeom prst="rect">
+            <a:avLst/>
+          </a:prstGeom>
+          <a:noFill/>
+        </p:spPr>
+        <p:txBody>
+          <a:bodyPr wrap="none" rtlCol="0">
+            <a:spAutoFit/>
+          </a:bodyPr>
+          <a:lstStyle/>
+          <a:p>
+            <a:r>
+              <a:rPr lang="en-US" sz="3600" b="1" dirty="0">
+                <a:solidFill>
+                  <a:schemeClr val="bg1"/>
+                </a:solidFill>
+                <a:latin typeface="Candara" panose="020E0502030303020204" pitchFamily="34" charset="0"/>
+              </a:rPr>
+              <a:t>Bias—Variance Compromise</a:t>
+            </a:r>
+          </a:p>
+        </p:txBody>
+      </p:sp>
+      <p:pic>
+        <p:nvPicPr>
+          <p:cNvPr id="2050" name="Picture 2" descr="Curve-Fitting">
+            <a:extLst>
+              <a:ext uri="{FF2B5EF4-FFF2-40B4-BE49-F238E27FC236}">
+                <a16:creationId xmlns:a16="http://schemas.microsoft.com/office/drawing/2014/main" id="{3E6DFC5D-A942-4E10-998A-BE41CFB2D77D}"/>
+              </a:ext>
+            </a:extLst>
+          </p:cNvPr>
+          <p:cNvPicPr>
+            <a:picLocks noChangeAspect="1" noChangeArrowheads="1"/>
+          </p:cNvPicPr>
+          <p:nvPr/>
+        </p:nvPicPr>
+        <p:blipFill>
+          <a:blip r:embed="rId3">
+            <a:extLst>
+              <a:ext uri="{28A0092B-C50C-407E-A947-70E740481C1C}">
+                <a14:useLocalDpi xmlns:a14="http://schemas.microsoft.com/office/drawing/2010/main" val="0"/>
+              </a:ext>
+            </a:extLst>
+          </a:blip>
+          <a:srcRect/>
+          <a:stretch>
+            <a:fillRect/>
+          </a:stretch>
+        </p:blipFill>
+        <p:spPr bwMode="auto">
+          <a:xfrm>
+            <a:off x="2607829" y="556168"/>
+            <a:ext cx="3928341" cy="6234545"/>
+          </a:xfrm>
+          <a:prstGeom prst="rect">
+            <a:avLst/>
+          </a:prstGeom>
+          <a:noFill/>
+          <a:extLst>
+            <a:ext uri="{909E8E84-426E-40DD-AFC4-6F175D3DCCD1}">
+              <a14:hiddenFill xmlns:a14="http://schemas.microsoft.com/office/drawing/2010/main">
+                <a:solidFill>
+                  <a:srgbClr val="FFFFFF"/>
+                </a:solidFill>
+              </a14:hiddenFill>
+            </a:ext>
+          </a:extLst>
+        </p:spPr>
+      </p:pic>
+      <p:sp>
+        <p:nvSpPr>
+          <p:cNvPr id="3" name="Rectangle 2">
+            <a:extLst>
+              <a:ext uri="{FF2B5EF4-FFF2-40B4-BE49-F238E27FC236}">
+                <a16:creationId xmlns:a16="http://schemas.microsoft.com/office/drawing/2014/main" id="{E95F6645-1DB8-4A81-809F-4789160A7789}"/>
+              </a:ext>
+            </a:extLst>
+          </p:cNvPr>
+          <p:cNvSpPr/>
+          <p:nvPr/>
+        </p:nvSpPr>
+        <p:spPr>
+          <a:xfrm>
+            <a:off x="6701820" y="6421381"/>
+            <a:ext cx="2432654" cy="369332"/>
+          </a:xfrm>
+          <a:prstGeom prst="rect">
+            <a:avLst/>
+          </a:prstGeom>
+        </p:spPr>
+        <p:txBody>
+          <a:bodyPr wrap="none">
+            <a:spAutoFit/>
+          </a:bodyPr>
+          <a:lstStyle/>
+          <a:p>
+            <a:r>
+              <a:rPr lang="en-US" dirty="0">
+                <a:solidFill>
+                  <a:schemeClr val="bg1"/>
+                </a:solidFill>
+                <a:latin typeface="Candara" panose="020E0502030303020204" pitchFamily="34" charset="0"/>
+                <a:hlinkClick r:id="rId4">
+                  <a:extLst>
+                    <a:ext uri="{A12FA001-AC4F-418D-AE19-62706E023703}">
+                      <ahyp:hlinkClr xmlns:ahyp="http://schemas.microsoft.com/office/drawing/2018/hyperlinkcolor" val="tx"/>
+                    </a:ext>
+                  </a:extLst>
+                </a:hlinkClick>
+              </a:rPr>
+              <a:t>https://xkcd.com/2048/</a:t>
+            </a:r>
+            <a:endParaRPr lang="en-US" dirty="0">
+              <a:solidFill>
+                <a:schemeClr val="bg1"/>
+              </a:solidFill>
+              <a:latin typeface="Candara" panose="020E0502030303020204" pitchFamily="34" charset="0"/>
+            </a:endParaRPr>
+          </a:p>
+        </p:txBody>
+      </p:sp>
+    </p:spTree>
+    <p:extLst>
+      <p:ext uri="{BB962C8B-B14F-4D97-AF65-F5344CB8AC3E}">
+        <p14:creationId xmlns:p14="http://schemas.microsoft.com/office/powerpoint/2010/main" val="70866279"/>
+      </p:ext>
+    </p:extLst>
+  </p:cSld>
+  <p:clrMapOvr>
+    <a:masterClrMapping/>
+  </p:clrMapOvr>
+</p:sld>
+</file>
+
+<file path=ppt/slides/slide11.xml><?xml version="1.0" encoding="utf-8"?>
+<p:sld xmlns:a="http://schemas.openxmlformats.org/drawingml/2006/main" xmlns:r="http://schemas.openxmlformats.org/officeDocument/2006/relationships" xmlns:p="http://schemas.openxmlformats.org/presentationml/2006/main">
+  <p:cSld>
+    <p:bg>
+      <p:bgPr>
+        <a:solidFill>
+          <a:schemeClr val="tx1"/>
+        </a:solidFill>
+        <a:effectLst/>
+      </p:bgPr>
+    </p:bg>
+    <p:spTree>
+      <p:nvGrpSpPr>
+        <p:cNvPr id="1" name=""/>
+        <p:cNvGrpSpPr/>
+        <p:nvPr/>
+      </p:nvGrpSpPr>
+      <p:grpSpPr>
+        <a:xfrm>
+          <a:off x="0" y="0"/>
+          <a:ext cx="0" cy="0"/>
+          <a:chOff x="0" y="0"/>
+          <a:chExt cx="0" cy="0"/>
+        </a:xfrm>
+      </p:grpSpPr>
+      <p:sp>
+        <p:nvSpPr>
           <p:cNvPr id="11" name="TextBox 10">
             <a:extLst>
               <a:ext uri="{FF2B5EF4-FFF2-40B4-BE49-F238E27FC236}">
@@ -6762,7 +7078,7 @@
 </p:sld>
 </file>
 
-<file path=ppt/slides/slide11.xml><?xml version="1.0" encoding="utf-8"?>
+<file path=ppt/slides/slide12.xml><?xml version="1.0" encoding="utf-8"?>
 <p:sld xmlns:a="http://schemas.openxmlformats.org/drawingml/2006/main" xmlns:r="http://schemas.openxmlformats.org/officeDocument/2006/relationships" xmlns:p="http://schemas.openxmlformats.org/presentationml/2006/main">
   <p:cSld>
     <p:bg>
@@ -7170,7 +7486,7 @@
 </p:sld>
 </file>
 
-<file path=ppt/slides/slide12.xml><?xml version="1.0" encoding="utf-8"?>
+<file path=ppt/slides/slide13.xml><?xml version="1.0" encoding="utf-8"?>
 <p:sld xmlns:a="http://schemas.openxmlformats.org/drawingml/2006/main" xmlns:r="http://schemas.openxmlformats.org/officeDocument/2006/relationships" xmlns:p="http://schemas.openxmlformats.org/presentationml/2006/main">
   <p:cSld>
     <p:bg>
@@ -7983,7 +8299,7 @@
 </p:sld>
 </file>
 
-<file path=ppt/slides/slide13.xml><?xml version="1.0" encoding="utf-8"?>
+<file path=ppt/slides/slide14.xml><?xml version="1.0" encoding="utf-8"?>
 <p:sld xmlns:a="http://schemas.openxmlformats.org/drawingml/2006/main" xmlns:r="http://schemas.openxmlformats.org/officeDocument/2006/relationships" xmlns:p="http://schemas.openxmlformats.org/presentationml/2006/main">
   <p:cSld>
     <p:bg>
@@ -8243,7 +8559,7 @@
 </p:sld>
 </file>
 
-<file path=ppt/slides/slide14.xml><?xml version="1.0" encoding="utf-8"?>
+<file path=ppt/slides/slide15.xml><?xml version="1.0" encoding="utf-8"?>
 <p:sld xmlns:a="http://schemas.openxmlformats.org/drawingml/2006/main" xmlns:r="http://schemas.openxmlformats.org/officeDocument/2006/relationships" xmlns:p="http://schemas.openxmlformats.org/presentationml/2006/main">
   <p:cSld>
     <p:bg>
@@ -9104,7 +9420,7 @@
 </p:sld>
 </file>
 
-<file path=ppt/slides/slide15.xml><?xml version="1.0" encoding="utf-8"?>
+<file path=ppt/slides/slide16.xml><?xml version="1.0" encoding="utf-8"?>
 <p:sld xmlns:a="http://schemas.openxmlformats.org/drawingml/2006/main" xmlns:r="http://schemas.openxmlformats.org/officeDocument/2006/relationships" xmlns:p="http://schemas.openxmlformats.org/presentationml/2006/main">
   <p:cSld>
     <p:bg>
@@ -11006,307 +11322,6 @@
 </p:sld>
 </file>
 
-<file path=ppt/slides/slide16.xml><?xml version="1.0" encoding="utf-8"?>
-<p:sld xmlns:a="http://schemas.openxmlformats.org/drawingml/2006/main" xmlns:r="http://schemas.openxmlformats.org/officeDocument/2006/relationships" xmlns:p="http://schemas.openxmlformats.org/presentationml/2006/main">
-  <p:cSld>
-    <p:bg>
-      <p:bgPr>
-        <a:solidFill>
-          <a:schemeClr val="tx1"/>
-        </a:solidFill>
-        <a:effectLst/>
-      </p:bgPr>
-    </p:bg>
-    <p:spTree>
-      <p:nvGrpSpPr>
-        <p:cNvPr id="1" name=""/>
-        <p:cNvGrpSpPr/>
-        <p:nvPr/>
-      </p:nvGrpSpPr>
-      <p:grpSpPr>
-        <a:xfrm>
-          <a:off x="0" y="0"/>
-          <a:ext cx="0" cy="0"/>
-          <a:chOff x="0" y="0"/>
-          <a:chExt cx="0" cy="0"/>
-        </a:xfrm>
-      </p:grpSpPr>
-      <p:sp>
-        <p:nvSpPr>
-          <p:cNvPr id="11" name="TextBox 10">
-            <a:extLst>
-              <a:ext uri="{FF2B5EF4-FFF2-40B4-BE49-F238E27FC236}">
-                <a16:creationId xmlns:a16="http://schemas.microsoft.com/office/drawing/2014/main" id="{94F7AF02-97E2-4C34-A6BC-ADE93CE4F163}"/>
-              </a:ext>
-            </a:extLst>
-          </p:cNvPr>
-          <p:cNvSpPr txBox="1"/>
-          <p:nvPr/>
-        </p:nvSpPr>
-        <p:spPr>
-          <a:xfrm>
-            <a:off x="9525" y="-38784"/>
-            <a:ext cx="3770006" cy="646331"/>
-          </a:xfrm>
-          <a:prstGeom prst="rect">
-            <a:avLst/>
-          </a:prstGeom>
-          <a:noFill/>
-        </p:spPr>
-        <p:txBody>
-          <a:bodyPr wrap="none" rtlCol="0">
-            <a:spAutoFit/>
-          </a:bodyPr>
-          <a:lstStyle/>
-          <a:p>
-            <a:r>
-              <a:rPr lang="en-US" sz="3600" b="1" dirty="0">
-                <a:solidFill>
-                  <a:schemeClr val="bg1"/>
-                </a:solidFill>
-                <a:latin typeface="Candara" panose="020E0502030303020204" pitchFamily="34" charset="0"/>
-              </a:rPr>
-              <a:t>Validation Metrics</a:t>
-            </a:r>
-          </a:p>
-        </p:txBody>
-      </p:sp>
-      <p:sp>
-        <p:nvSpPr>
-          <p:cNvPr id="2" name="Rectangle 1">
-            <a:extLst>
-              <a:ext uri="{FF2B5EF4-FFF2-40B4-BE49-F238E27FC236}">
-                <a16:creationId xmlns:a16="http://schemas.microsoft.com/office/drawing/2014/main" id="{84A8AAE2-5A41-4864-9BCA-3DCFD5CE5D70}"/>
-              </a:ext>
-            </a:extLst>
-          </p:cNvPr>
-          <p:cNvSpPr/>
-          <p:nvPr/>
-        </p:nvSpPr>
-        <p:spPr>
-          <a:xfrm>
-            <a:off x="642613" y="710817"/>
-            <a:ext cx="8021553" cy="6093976"/>
-          </a:xfrm>
-          <a:prstGeom prst="rect">
-            <a:avLst/>
-          </a:prstGeom>
-        </p:spPr>
-        <p:txBody>
-          <a:bodyPr wrap="square">
-            <a:spAutoFit/>
-          </a:bodyPr>
-          <a:lstStyle/>
-          <a:p>
-            <a:pPr marL="342900" indent="-342900">
-              <a:buFont typeface="Arial" panose="020B0604020202020204" pitchFamily="34" charset="0"/>
-              <a:buChar char="•"/>
-            </a:pPr>
-            <a:r>
-              <a:rPr lang="en-US" sz="3000" dirty="0">
-                <a:solidFill>
-                  <a:schemeClr val="bg1"/>
-                </a:solidFill>
-                <a:latin typeface="Candara" panose="020E0502030303020204" pitchFamily="34" charset="0"/>
-              </a:rPr>
-              <a:t>Ratio (continuous)</a:t>
-            </a:r>
-          </a:p>
-          <a:p>
-            <a:pPr marL="800100" lvl="1" indent="-342900">
-              <a:buFont typeface="Arial" panose="020B0604020202020204" pitchFamily="34" charset="0"/>
-              <a:buChar char="•"/>
-            </a:pPr>
-            <a:r>
-              <a:rPr lang="en-US" sz="3000" dirty="0">
-                <a:solidFill>
-                  <a:schemeClr val="bg1"/>
-                </a:solidFill>
-                <a:latin typeface="Candara" panose="020E0502030303020204" pitchFamily="34" charset="0"/>
-              </a:rPr>
-              <a:t>RMSE</a:t>
-            </a:r>
-          </a:p>
-          <a:p>
-            <a:pPr marL="800100" lvl="1" indent="-342900">
-              <a:buFont typeface="Arial" panose="020B0604020202020204" pitchFamily="34" charset="0"/>
-              <a:buChar char="•"/>
-            </a:pPr>
-            <a:r>
-              <a:rPr lang="en-US" sz="3000" dirty="0">
-                <a:solidFill>
-                  <a:schemeClr val="bg1"/>
-                </a:solidFill>
-                <a:latin typeface="Candara" panose="020E0502030303020204" pitchFamily="34" charset="0"/>
-              </a:rPr>
-              <a:t>MAE</a:t>
-            </a:r>
-          </a:p>
-          <a:p>
-            <a:pPr marL="800100" lvl="1" indent="-342900">
-              <a:buFont typeface="Arial" panose="020B0604020202020204" pitchFamily="34" charset="0"/>
-              <a:buChar char="•"/>
-            </a:pPr>
-            <a:r>
-              <a:rPr lang="en-US" sz="3000" dirty="0">
-                <a:solidFill>
-                  <a:schemeClr val="bg1"/>
-                </a:solidFill>
-                <a:latin typeface="Candara" panose="020E0502030303020204" pitchFamily="34" charset="0"/>
-              </a:rPr>
-              <a:t>correlation coefficient</a:t>
-            </a:r>
-          </a:p>
-          <a:p>
-            <a:pPr marL="800100" lvl="1" indent="-342900">
-              <a:buFont typeface="Arial" panose="020B0604020202020204" pitchFamily="34" charset="0"/>
-              <a:buChar char="•"/>
-            </a:pPr>
-            <a:r>
-              <a:rPr lang="en-US" sz="3000" dirty="0">
-                <a:solidFill>
-                  <a:schemeClr val="bg1"/>
-                </a:solidFill>
-                <a:latin typeface="Candara" panose="020E0502030303020204" pitchFamily="34" charset="0"/>
-              </a:rPr>
-              <a:t>mean "distance" (n-D)  from standard</a:t>
-            </a:r>
-            <a:br>
-              <a:rPr lang="en-US" sz="3000" dirty="0">
-                <a:solidFill>
-                  <a:schemeClr val="bg1"/>
-                </a:solidFill>
-                <a:latin typeface="Candara" panose="020E0502030303020204" pitchFamily="34" charset="0"/>
-              </a:rPr>
-            </a:br>
-            <a:endParaRPr lang="en-US" sz="3000" dirty="0">
-              <a:solidFill>
-                <a:schemeClr val="bg1"/>
-              </a:solidFill>
-              <a:latin typeface="Candara" panose="020E0502030303020204" pitchFamily="34" charset="0"/>
-            </a:endParaRPr>
-          </a:p>
-          <a:p>
-            <a:pPr marL="342900" indent="-342900">
-              <a:buFont typeface="Arial" panose="020B0604020202020204" pitchFamily="34" charset="0"/>
-              <a:buChar char="•"/>
-            </a:pPr>
-            <a:r>
-              <a:rPr lang="en-US" sz="3000" dirty="0">
-                <a:solidFill>
-                  <a:schemeClr val="bg1"/>
-                </a:solidFill>
-                <a:latin typeface="Candara" panose="020E0502030303020204" pitchFamily="34" charset="0"/>
-              </a:rPr>
-              <a:t>Nominal (categorical, without order)</a:t>
-            </a:r>
-          </a:p>
-          <a:p>
-            <a:pPr marL="800100" lvl="1" indent="-342900">
-              <a:buFont typeface="Arial" panose="020B0604020202020204" pitchFamily="34" charset="0"/>
-              <a:buChar char="•"/>
-            </a:pPr>
-            <a:r>
-              <a:rPr lang="en-US" sz="3000" dirty="0">
-                <a:solidFill>
-                  <a:schemeClr val="bg1"/>
-                </a:solidFill>
-                <a:latin typeface="Candara" panose="020E0502030303020204" pitchFamily="34" charset="0"/>
-              </a:rPr>
-              <a:t>probability-based:</a:t>
-            </a:r>
-          </a:p>
-          <a:p>
-            <a:pPr marL="1257300" lvl="2" indent="-342900">
-              <a:buFont typeface="Arial" panose="020B0604020202020204" pitchFamily="34" charset="0"/>
-              <a:buChar char="•"/>
-            </a:pPr>
-            <a:r>
-              <a:rPr lang="en-US" sz="3000" dirty="0">
-                <a:solidFill>
-                  <a:schemeClr val="bg1"/>
-                </a:solidFill>
-                <a:latin typeface="Candara" panose="020E0502030303020204" pitchFamily="34" charset="0"/>
-              </a:rPr>
-              <a:t>Brier score</a:t>
-            </a:r>
-          </a:p>
-          <a:p>
-            <a:pPr marL="800100" lvl="1" indent="-342900">
-              <a:buFont typeface="Arial" panose="020B0604020202020204" pitchFamily="34" charset="0"/>
-              <a:buChar char="•"/>
-            </a:pPr>
-            <a:r>
-              <a:rPr lang="en-US" sz="3000" dirty="0">
-                <a:solidFill>
-                  <a:schemeClr val="bg1"/>
-                </a:solidFill>
-                <a:latin typeface="Candara" panose="020E0502030303020204" pitchFamily="34" charset="0"/>
-              </a:rPr>
-              <a:t>confusion matrix-based:</a:t>
-            </a:r>
-          </a:p>
-          <a:p>
-            <a:pPr marL="1257300" lvl="2" indent="-342900">
-              <a:buFont typeface="Arial" panose="020B0604020202020204" pitchFamily="34" charset="0"/>
-              <a:buChar char="•"/>
-            </a:pPr>
-            <a:r>
-              <a:rPr lang="en-US" sz="3000" dirty="0">
-                <a:solidFill>
-                  <a:schemeClr val="bg1"/>
-                </a:solidFill>
-                <a:latin typeface="Candara" panose="020E0502030303020204" pitchFamily="34" charset="0"/>
-              </a:rPr>
-              <a:t>% correctly classified</a:t>
-            </a:r>
-          </a:p>
-          <a:p>
-            <a:pPr marL="1257300" lvl="2" indent="-342900">
-              <a:buFont typeface="Arial" panose="020B0604020202020204" pitchFamily="34" charset="0"/>
-              <a:buChar char="•"/>
-            </a:pPr>
-            <a:r>
-              <a:rPr lang="en-US" sz="3000" dirty="0">
-                <a:solidFill>
-                  <a:schemeClr val="bg1"/>
-                </a:solidFill>
-                <a:latin typeface="Candara" panose="020E0502030303020204" pitchFamily="34" charset="0"/>
-              </a:rPr>
-              <a:t>kappa</a:t>
-            </a:r>
-          </a:p>
-          <a:p>
-            <a:pPr marL="1257300" lvl="2" indent="-342900">
-              <a:buFont typeface="Arial" panose="020B0604020202020204" pitchFamily="34" charset="0"/>
-              <a:buChar char="•"/>
-            </a:pPr>
-            <a:r>
-              <a:rPr lang="en-US" sz="3000" dirty="0">
-                <a:solidFill>
-                  <a:schemeClr val="bg1"/>
-                </a:solidFill>
-                <a:latin typeface="Candara" panose="020E0502030303020204" pitchFamily="34" charset="0"/>
-              </a:rPr>
-              <a:t>weighted tau</a:t>
-            </a:r>
-            <a:endParaRPr lang="en-US" sz="3000" dirty="0"/>
-          </a:p>
-        </p:txBody>
-      </p:sp>
-    </p:spTree>
-    <p:extLst>
-      <p:ext uri="{BB962C8B-B14F-4D97-AF65-F5344CB8AC3E}">
-        <p14:creationId xmlns:p14="http://schemas.microsoft.com/office/powerpoint/2010/main" val="1947012522"/>
-      </p:ext>
-    </p:extLst>
-  </p:cSld>
-  <p:clrMapOvr>
-    <a:masterClrMapping/>
-  </p:clrMapOvr>
-</p:sld>
-</file>
-
 <file path=ppt/slides/slide17.xml><?xml version="1.0" encoding="utf-8"?>
 <p:sld xmlns:a="http://schemas.openxmlformats.org/drawingml/2006/main" xmlns:r="http://schemas.openxmlformats.org/officeDocument/2006/relationships" xmlns:p="http://schemas.openxmlformats.org/presentationml/2006/main">
   <p:cSld>
@@ -11347,7 +11362,7 @@
         <p:spPr>
           <a:xfrm>
             <a:off x="9525" y="-38784"/>
-            <a:ext cx="4110421" cy="646331"/>
+            <a:ext cx="3770006" cy="646331"/>
           </a:xfrm>
           <a:prstGeom prst="rect">
             <a:avLst/>
@@ -11367,7 +11382,7 @@
                 </a:solidFill>
                 <a:latin typeface="Candara" panose="020E0502030303020204" pitchFamily="34" charset="0"/>
               </a:rPr>
-              <a:t>Uncertainty Metrics</a:t>
+              <a:t>Validation Metrics</a:t>
             </a:r>
           </a:p>
         </p:txBody>
@@ -11386,8 +11401,8 @@
         </p:nvSpPr>
         <p:spPr>
           <a:xfrm>
-            <a:off x="642613" y="843676"/>
-            <a:ext cx="8021553" cy="3785652"/>
+            <a:off x="642613" y="710817"/>
+            <a:ext cx="8021553" cy="6093976"/>
           </a:xfrm>
           <a:prstGeom prst="rect">
             <a:avLst/>
@@ -11425,7 +11440,7 @@
                 </a:solidFill>
                 <a:latin typeface="Candara" panose="020E0502030303020204" pitchFamily="34" charset="0"/>
               </a:rPr>
-              <a:t>standard error of estimates (SE)</a:t>
+              <a:t>RMSE</a:t>
             </a:r>
           </a:p>
           <a:p>
@@ -11440,7 +11455,7 @@
                 </a:solidFill>
                 <a:latin typeface="Candara" panose="020E0502030303020204" pitchFamily="34" charset="0"/>
               </a:rPr>
-              <a:t>prediction intervals (percentiles)</a:t>
+              <a:t>MAE</a:t>
             </a:r>
           </a:p>
           <a:p>
@@ -11455,7 +11470,22 @@
                 </a:solidFill>
                 <a:latin typeface="Candara" panose="020E0502030303020204" pitchFamily="34" charset="0"/>
               </a:rPr>
-              <a:t>distance / contrast (i.e., soil color)</a:t>
+              <a:t>correlation coefficient</a:t>
+            </a:r>
+          </a:p>
+          <a:p>
+            <a:pPr marL="800100" lvl="1" indent="-342900">
+              <a:buFont typeface="Arial" panose="020B0604020202020204" pitchFamily="34" charset="0"/>
+              <a:buChar char="•"/>
+            </a:pPr>
+            <a:r>
+              <a:rPr lang="en-US" sz="3000" dirty="0">
+                <a:solidFill>
+                  <a:schemeClr val="bg1"/>
+                </a:solidFill>
+                <a:latin typeface="Candara" panose="020E0502030303020204" pitchFamily="34" charset="0"/>
+              </a:rPr>
+              <a:t>mean "distance" (n-D)  from standard</a:t>
             </a:r>
             <a:br>
               <a:rPr lang="en-US" sz="3000" dirty="0">
@@ -11499,7 +11529,22 @@
                 </a:solidFill>
                 <a:latin typeface="Candara" panose="020E0502030303020204" pitchFamily="34" charset="0"/>
               </a:rPr>
-              <a:t>Shannon entropy</a:t>
+              <a:t>probability-based:</a:t>
+            </a:r>
+          </a:p>
+          <a:p>
+            <a:pPr marL="1257300" lvl="2" indent="-342900">
+              <a:buFont typeface="Arial" panose="020B0604020202020204" pitchFamily="34" charset="0"/>
+              <a:buChar char="•"/>
+            </a:pPr>
+            <a:r>
+              <a:rPr lang="en-US" sz="3000" dirty="0">
+                <a:solidFill>
+                  <a:schemeClr val="bg1"/>
+                </a:solidFill>
+                <a:latin typeface="Candara" panose="020E0502030303020204" pitchFamily="34" charset="0"/>
+              </a:rPr>
+              <a:t>Brier score</a:t>
             </a:r>
           </a:p>
           <a:p>
@@ -11514,7 +11559,52 @@
                 </a:solidFill>
                 <a:latin typeface="Candara" panose="020E0502030303020204" pitchFamily="34" charset="0"/>
               </a:rPr>
-              <a:t>confusion index</a:t>
+              <a:t>confusion matrix-based:</a:t>
+            </a:r>
+          </a:p>
+          <a:p>
+            <a:pPr marL="1257300" lvl="2" indent="-342900">
+              <a:buFont typeface="Arial" panose="020B0604020202020204" pitchFamily="34" charset="0"/>
+              <a:buChar char="•"/>
+            </a:pPr>
+            <a:r>
+              <a:rPr lang="en-US" sz="3000" dirty="0">
+                <a:solidFill>
+                  <a:schemeClr val="bg1"/>
+                </a:solidFill>
+                <a:latin typeface="Candara" panose="020E0502030303020204" pitchFamily="34" charset="0"/>
+              </a:rPr>
+              <a:t>% correctly classified</a:t>
+            </a:r>
+          </a:p>
+          <a:p>
+            <a:pPr marL="1257300" lvl="2" indent="-342900">
+              <a:buFont typeface="Arial" panose="020B0604020202020204" pitchFamily="34" charset="0"/>
+              <a:buChar char="•"/>
+            </a:pPr>
+            <a:r>
+              <a:rPr lang="en-US" sz="3000" dirty="0">
+                <a:solidFill>
+                  <a:schemeClr val="bg1"/>
+                </a:solidFill>
+                <a:latin typeface="Candara" panose="020E0502030303020204" pitchFamily="34" charset="0"/>
+              </a:rPr>
+              <a:t>kappa</a:t>
+            </a:r>
+          </a:p>
+          <a:p>
+            <a:pPr marL="1257300" lvl="2" indent="-342900">
+              <a:buFont typeface="Arial" panose="020B0604020202020204" pitchFamily="34" charset="0"/>
+              <a:buChar char="•"/>
+            </a:pPr>
+            <a:r>
+              <a:rPr lang="en-US" sz="3000" dirty="0">
+                <a:solidFill>
+                  <a:schemeClr val="bg1"/>
+                </a:solidFill>
+                <a:latin typeface="Candara" panose="020E0502030303020204" pitchFamily="34" charset="0"/>
+              </a:rPr>
+              <a:t>weighted tau</a:t>
             </a:r>
             <a:endParaRPr lang="en-US" sz="3000" dirty="0"/>
           </a:p>
@@ -11523,7 +11613,7 @@
     </p:spTree>
     <p:extLst>
       <p:ext uri="{BB962C8B-B14F-4D97-AF65-F5344CB8AC3E}">
-        <p14:creationId xmlns:p14="http://schemas.microsoft.com/office/powerpoint/2010/main" val="2540044603"/>
+        <p14:creationId xmlns:p14="http://schemas.microsoft.com/office/powerpoint/2010/main" val="1947012522"/>
       </p:ext>
     </p:extLst>
   </p:cSld>
@@ -11573,6 +11663,232 @@
         <p:spPr>
           <a:xfrm>
             <a:off x="9525" y="-38784"/>
+            <a:ext cx="4110421" cy="646331"/>
+          </a:xfrm>
+          <a:prstGeom prst="rect">
+            <a:avLst/>
+          </a:prstGeom>
+          <a:noFill/>
+        </p:spPr>
+        <p:txBody>
+          <a:bodyPr wrap="none" rtlCol="0">
+            <a:spAutoFit/>
+          </a:bodyPr>
+          <a:lstStyle/>
+          <a:p>
+            <a:r>
+              <a:rPr lang="en-US" sz="3600" b="1" dirty="0">
+                <a:solidFill>
+                  <a:schemeClr val="bg1"/>
+                </a:solidFill>
+                <a:latin typeface="Candara" panose="020E0502030303020204" pitchFamily="34" charset="0"/>
+              </a:rPr>
+              <a:t>Uncertainty Metrics</a:t>
+            </a:r>
+          </a:p>
+        </p:txBody>
+      </p:sp>
+      <p:sp>
+        <p:nvSpPr>
+          <p:cNvPr id="2" name="Rectangle 1">
+            <a:extLst>
+              <a:ext uri="{FF2B5EF4-FFF2-40B4-BE49-F238E27FC236}">
+                <a16:creationId xmlns:a16="http://schemas.microsoft.com/office/drawing/2014/main" id="{84A8AAE2-5A41-4864-9BCA-3DCFD5CE5D70}"/>
+              </a:ext>
+            </a:extLst>
+          </p:cNvPr>
+          <p:cNvSpPr/>
+          <p:nvPr/>
+        </p:nvSpPr>
+        <p:spPr>
+          <a:xfrm>
+            <a:off x="642613" y="843676"/>
+            <a:ext cx="8021553" cy="3785652"/>
+          </a:xfrm>
+          <a:prstGeom prst="rect">
+            <a:avLst/>
+          </a:prstGeom>
+        </p:spPr>
+        <p:txBody>
+          <a:bodyPr wrap="square">
+            <a:spAutoFit/>
+          </a:bodyPr>
+          <a:lstStyle/>
+          <a:p>
+            <a:pPr marL="342900" indent="-342900">
+              <a:buFont typeface="Arial" panose="020B0604020202020204" pitchFamily="34" charset="0"/>
+              <a:buChar char="•"/>
+            </a:pPr>
+            <a:r>
+              <a:rPr lang="en-US" sz="3000" dirty="0">
+                <a:solidFill>
+                  <a:schemeClr val="bg1"/>
+                </a:solidFill>
+                <a:latin typeface="Candara" panose="020E0502030303020204" pitchFamily="34" charset="0"/>
+              </a:rPr>
+              <a:t>Ratio (continuous)</a:t>
+            </a:r>
+          </a:p>
+          <a:p>
+            <a:pPr marL="800100" lvl="1" indent="-342900">
+              <a:buFont typeface="Arial" panose="020B0604020202020204" pitchFamily="34" charset="0"/>
+              <a:buChar char="•"/>
+            </a:pPr>
+            <a:r>
+              <a:rPr lang="en-US" sz="3000" dirty="0">
+                <a:solidFill>
+                  <a:schemeClr val="bg1"/>
+                </a:solidFill>
+                <a:latin typeface="Candara" panose="020E0502030303020204" pitchFamily="34" charset="0"/>
+              </a:rPr>
+              <a:t>standard error of estimates (SE)</a:t>
+            </a:r>
+          </a:p>
+          <a:p>
+            <a:pPr marL="800100" lvl="1" indent="-342900">
+              <a:buFont typeface="Arial" panose="020B0604020202020204" pitchFamily="34" charset="0"/>
+              <a:buChar char="•"/>
+            </a:pPr>
+            <a:r>
+              <a:rPr lang="en-US" sz="3000" dirty="0">
+                <a:solidFill>
+                  <a:schemeClr val="bg1"/>
+                </a:solidFill>
+                <a:latin typeface="Candara" panose="020E0502030303020204" pitchFamily="34" charset="0"/>
+              </a:rPr>
+              <a:t>prediction intervals (percentiles)</a:t>
+            </a:r>
+          </a:p>
+          <a:p>
+            <a:pPr marL="800100" lvl="1" indent="-342900">
+              <a:buFont typeface="Arial" panose="020B0604020202020204" pitchFamily="34" charset="0"/>
+              <a:buChar char="•"/>
+            </a:pPr>
+            <a:r>
+              <a:rPr lang="en-US" sz="3000" dirty="0">
+                <a:solidFill>
+                  <a:schemeClr val="bg1"/>
+                </a:solidFill>
+                <a:latin typeface="Candara" panose="020E0502030303020204" pitchFamily="34" charset="0"/>
+              </a:rPr>
+              <a:t>distance / contrast (i.e., soil color)</a:t>
+            </a:r>
+            <a:br>
+              <a:rPr lang="en-US" sz="3000" dirty="0">
+                <a:solidFill>
+                  <a:schemeClr val="bg1"/>
+                </a:solidFill>
+                <a:latin typeface="Candara" panose="020E0502030303020204" pitchFamily="34" charset="0"/>
+              </a:rPr>
+            </a:br>
+            <a:endParaRPr lang="en-US" sz="3000" dirty="0">
+              <a:solidFill>
+                <a:schemeClr val="bg1"/>
+              </a:solidFill>
+              <a:latin typeface="Candara" panose="020E0502030303020204" pitchFamily="34" charset="0"/>
+            </a:endParaRPr>
+          </a:p>
+          <a:p>
+            <a:pPr marL="342900" indent="-342900">
+              <a:buFont typeface="Arial" panose="020B0604020202020204" pitchFamily="34" charset="0"/>
+              <a:buChar char="•"/>
+            </a:pPr>
+            <a:r>
+              <a:rPr lang="en-US" sz="3000" dirty="0">
+                <a:solidFill>
+                  <a:schemeClr val="bg1"/>
+                </a:solidFill>
+                <a:latin typeface="Candara" panose="020E0502030303020204" pitchFamily="34" charset="0"/>
+              </a:rPr>
+              <a:t>Nominal (categorical, without order)</a:t>
+            </a:r>
+          </a:p>
+          <a:p>
+            <a:pPr marL="800100" lvl="1" indent="-342900">
+              <a:buFont typeface="Arial" panose="020B0604020202020204" pitchFamily="34" charset="0"/>
+              <a:buChar char="•"/>
+            </a:pPr>
+            <a:r>
+              <a:rPr lang="en-US" sz="3000" dirty="0">
+                <a:solidFill>
+                  <a:schemeClr val="bg1"/>
+                </a:solidFill>
+                <a:latin typeface="Candara" panose="020E0502030303020204" pitchFamily="34" charset="0"/>
+              </a:rPr>
+              <a:t>Shannon entropy</a:t>
+            </a:r>
+          </a:p>
+          <a:p>
+            <a:pPr marL="800100" lvl="1" indent="-342900">
+              <a:buFont typeface="Arial" panose="020B0604020202020204" pitchFamily="34" charset="0"/>
+              <a:buChar char="•"/>
+            </a:pPr>
+            <a:r>
+              <a:rPr lang="en-US" sz="3000" dirty="0">
+                <a:solidFill>
+                  <a:schemeClr val="bg1"/>
+                </a:solidFill>
+                <a:latin typeface="Candara" panose="020E0502030303020204" pitchFamily="34" charset="0"/>
+              </a:rPr>
+              <a:t>confusion index</a:t>
+            </a:r>
+            <a:endParaRPr lang="en-US" sz="3000" dirty="0"/>
+          </a:p>
+        </p:txBody>
+      </p:sp>
+    </p:spTree>
+    <p:extLst>
+      <p:ext uri="{BB962C8B-B14F-4D97-AF65-F5344CB8AC3E}">
+        <p14:creationId xmlns:p14="http://schemas.microsoft.com/office/powerpoint/2010/main" val="2540044603"/>
+      </p:ext>
+    </p:extLst>
+  </p:cSld>
+  <p:clrMapOvr>
+    <a:masterClrMapping/>
+  </p:clrMapOvr>
+</p:sld>
+</file>
+
+<file path=ppt/slides/slide19.xml><?xml version="1.0" encoding="utf-8"?>
+<p:sld xmlns:a="http://schemas.openxmlformats.org/drawingml/2006/main" xmlns:r="http://schemas.openxmlformats.org/officeDocument/2006/relationships" xmlns:p="http://schemas.openxmlformats.org/presentationml/2006/main">
+  <p:cSld>
+    <p:bg>
+      <p:bgPr>
+        <a:solidFill>
+          <a:schemeClr val="tx1"/>
+        </a:solidFill>
+        <a:effectLst/>
+      </p:bgPr>
+    </p:bg>
+    <p:spTree>
+      <p:nvGrpSpPr>
+        <p:cNvPr id="1" name=""/>
+        <p:cNvGrpSpPr/>
+        <p:nvPr/>
+      </p:nvGrpSpPr>
+      <p:grpSpPr>
+        <a:xfrm>
+          <a:off x="0" y="0"/>
+          <a:ext cx="0" cy="0"/>
+          <a:chOff x="0" y="0"/>
+          <a:chExt cx="0" cy="0"/>
+        </a:xfrm>
+      </p:grpSpPr>
+      <p:sp>
+        <p:nvSpPr>
+          <p:cNvPr id="11" name="TextBox 10">
+            <a:extLst>
+              <a:ext uri="{FF2B5EF4-FFF2-40B4-BE49-F238E27FC236}">
+                <a16:creationId xmlns:a16="http://schemas.microsoft.com/office/drawing/2014/main" id="{94F7AF02-97E2-4C34-A6BC-ADE93CE4F163}"/>
+              </a:ext>
+            </a:extLst>
+          </p:cNvPr>
+          <p:cNvSpPr txBox="1"/>
+          <p:nvPr/>
+        </p:nvSpPr>
+        <p:spPr>
+          <a:xfrm>
+            <a:off x="9525" y="-38784"/>
             <a:ext cx="6381875" cy="646331"/>
           </a:xfrm>
           <a:prstGeom prst="rect">
@@ -12204,7 +12520,259 @@
 </p:sld>
 </file>
 
-<file path=ppt/slides/slide19.xml><?xml version="1.0" encoding="utf-8"?>
+<file path=ppt/slides/slide2.xml><?xml version="1.0" encoding="utf-8"?>
+<p:sld xmlns:a="http://schemas.openxmlformats.org/drawingml/2006/main" xmlns:r="http://schemas.openxmlformats.org/officeDocument/2006/relationships" xmlns:p="http://schemas.openxmlformats.org/presentationml/2006/main">
+  <p:cSld>
+    <p:bg>
+      <p:bgPr>
+        <a:solidFill>
+          <a:schemeClr val="tx1"/>
+        </a:solidFill>
+        <a:effectLst/>
+      </p:bgPr>
+    </p:bg>
+    <p:spTree>
+      <p:nvGrpSpPr>
+        <p:cNvPr id="1" name=""/>
+        <p:cNvGrpSpPr/>
+        <p:nvPr/>
+      </p:nvGrpSpPr>
+      <p:grpSpPr>
+        <a:xfrm>
+          <a:off x="0" y="0"/>
+          <a:ext cx="0" cy="0"/>
+          <a:chOff x="0" y="0"/>
+          <a:chExt cx="0" cy="0"/>
+        </a:xfrm>
+      </p:grpSpPr>
+      <p:sp>
+        <p:nvSpPr>
+          <p:cNvPr id="11" name="TextBox 10">
+            <a:extLst>
+              <a:ext uri="{FF2B5EF4-FFF2-40B4-BE49-F238E27FC236}">
+                <a16:creationId xmlns:a16="http://schemas.microsoft.com/office/drawing/2014/main" id="{94F7AF02-97E2-4C34-A6BC-ADE93CE4F163}"/>
+              </a:ext>
+            </a:extLst>
+          </p:cNvPr>
+          <p:cNvSpPr txBox="1"/>
+          <p:nvPr/>
+        </p:nvSpPr>
+        <p:spPr>
+          <a:xfrm>
+            <a:off x="9525" y="-38784"/>
+            <a:ext cx="1648208" cy="646331"/>
+          </a:xfrm>
+          <a:prstGeom prst="rect">
+            <a:avLst/>
+          </a:prstGeom>
+          <a:noFill/>
+        </p:spPr>
+        <p:txBody>
+          <a:bodyPr wrap="none" rtlCol="0">
+            <a:spAutoFit/>
+          </a:bodyPr>
+          <a:lstStyle/>
+          <a:p>
+            <a:r>
+              <a:rPr lang="en-US" sz="3600" b="1" dirty="0">
+                <a:solidFill>
+                  <a:schemeClr val="bg1"/>
+                </a:solidFill>
+                <a:latin typeface="Candara" panose="020E0502030303020204" pitchFamily="34" charset="0"/>
+              </a:rPr>
+              <a:t>Outline</a:t>
+            </a:r>
+          </a:p>
+        </p:txBody>
+      </p:sp>
+      <p:sp>
+        <p:nvSpPr>
+          <p:cNvPr id="4" name="Rectangle 3">
+            <a:extLst>
+              <a:ext uri="{FF2B5EF4-FFF2-40B4-BE49-F238E27FC236}">
+                <a16:creationId xmlns:a16="http://schemas.microsoft.com/office/drawing/2014/main" id="{5AD40034-C9A7-4F57-8AAC-4BB1F059CBD4}"/>
+              </a:ext>
+            </a:extLst>
+          </p:cNvPr>
+          <p:cNvSpPr/>
+          <p:nvPr/>
+        </p:nvSpPr>
+        <p:spPr>
+          <a:xfrm>
+            <a:off x="237303" y="4181475"/>
+            <a:ext cx="8394970" cy="2308324"/>
+          </a:xfrm>
+          <a:prstGeom prst="rect">
+            <a:avLst/>
+          </a:prstGeom>
+        </p:spPr>
+        <p:txBody>
+          <a:bodyPr wrap="square">
+            <a:spAutoFit/>
+          </a:bodyPr>
+          <a:lstStyle/>
+          <a:p>
+            <a:pPr marL="342900" indent="-342900">
+              <a:buFont typeface="Arial" panose="020B0604020202020204" pitchFamily="34" charset="0"/>
+              <a:buChar char="•"/>
+            </a:pPr>
+            <a:r>
+              <a:rPr lang="en-US" sz="3600" dirty="0">
+                <a:solidFill>
+                  <a:schemeClr val="bg1"/>
+                </a:solidFill>
+                <a:latin typeface="Candara" panose="020E0502030303020204" pitchFamily="34" charset="0"/>
+              </a:rPr>
+              <a:t>Definitions</a:t>
+            </a:r>
+          </a:p>
+          <a:p>
+            <a:pPr marL="342900" indent="-342900">
+              <a:buFont typeface="Arial" panose="020B0604020202020204" pitchFamily="34" charset="0"/>
+              <a:buChar char="•"/>
+            </a:pPr>
+            <a:r>
+              <a:rPr lang="en-US" sz="3600" dirty="0">
+                <a:solidFill>
+                  <a:schemeClr val="bg1"/>
+                </a:solidFill>
+                <a:latin typeface="Candara" panose="020E0502030303020204" pitchFamily="34" charset="0"/>
+              </a:rPr>
+              <a:t>Bias—Variance Compromise</a:t>
+            </a:r>
+          </a:p>
+          <a:p>
+            <a:pPr marL="342900" indent="-342900">
+              <a:buFont typeface="Arial" panose="020B0604020202020204" pitchFamily="34" charset="0"/>
+              <a:buChar char="•"/>
+            </a:pPr>
+            <a:r>
+              <a:rPr lang="en-US" sz="3600" dirty="0">
+                <a:solidFill>
+                  <a:schemeClr val="bg1"/>
+                </a:solidFill>
+                <a:latin typeface="Candara" panose="020E0502030303020204" pitchFamily="34" charset="0"/>
+              </a:rPr>
+              <a:t>Accuracy / Validation</a:t>
+            </a:r>
+          </a:p>
+          <a:p>
+            <a:pPr marL="342900" indent="-342900">
+              <a:buFont typeface="Arial" panose="020B0604020202020204" pitchFamily="34" charset="0"/>
+              <a:buChar char="•"/>
+            </a:pPr>
+            <a:r>
+              <a:rPr lang="en-US" sz="3600" dirty="0">
+                <a:solidFill>
+                  <a:schemeClr val="bg1"/>
+                </a:solidFill>
+                <a:latin typeface="Candara" panose="020E0502030303020204" pitchFamily="34" charset="0"/>
+              </a:rPr>
+              <a:t>Uncertainty</a:t>
+            </a:r>
+          </a:p>
+        </p:txBody>
+      </p:sp>
+      <p:pic>
+        <p:nvPicPr>
+          <p:cNvPr id="5" name="Picture 2" descr="Error Bars">
+            <a:extLst>
+              <a:ext uri="{FF2B5EF4-FFF2-40B4-BE49-F238E27FC236}">
+                <a16:creationId xmlns:a16="http://schemas.microsoft.com/office/drawing/2014/main" id="{EF1CAD1F-AD85-4639-9029-D5D07AF45FB3}"/>
+              </a:ext>
+            </a:extLst>
+          </p:cNvPr>
+          <p:cNvPicPr>
+            <a:picLocks noChangeAspect="1" noChangeArrowheads="1"/>
+          </p:cNvPicPr>
+          <p:nvPr/>
+        </p:nvPicPr>
+        <p:blipFill>
+          <a:blip r:embed="rId3">
+            <a:extLst>
+              <a:ext uri="{28A0092B-C50C-407E-A947-70E740481C1C}">
+                <a14:useLocalDpi xmlns:a14="http://schemas.microsoft.com/office/drawing/2010/main" val="0"/>
+              </a:ext>
+            </a:extLst>
+          </a:blip>
+          <a:srcRect/>
+          <a:stretch>
+            <a:fillRect/>
+          </a:stretch>
+        </p:blipFill>
+        <p:spPr bwMode="auto">
+          <a:xfrm>
+            <a:off x="4628405" y="215972"/>
+            <a:ext cx="4259732" cy="4069567"/>
+          </a:xfrm>
+          <a:prstGeom prst="rect">
+            <a:avLst/>
+          </a:prstGeom>
+          <a:noFill/>
+          <a:extLst>
+            <a:ext uri="{909E8E84-426E-40DD-AFC4-6F175D3DCCD1}">
+              <a14:hiddenFill xmlns:a14="http://schemas.microsoft.com/office/drawing/2010/main">
+                <a:solidFill>
+                  <a:srgbClr val="FFFFFF"/>
+                </a:solidFill>
+              </a14:hiddenFill>
+            </a:ext>
+          </a:extLst>
+        </p:spPr>
+      </p:pic>
+      <p:sp>
+        <p:nvSpPr>
+          <p:cNvPr id="6" name="Rectangle 5">
+            <a:extLst>
+              <a:ext uri="{FF2B5EF4-FFF2-40B4-BE49-F238E27FC236}">
+                <a16:creationId xmlns:a16="http://schemas.microsoft.com/office/drawing/2014/main" id="{8A3AA20C-ADAE-40F3-B8D3-D02E93A4010C}"/>
+              </a:ext>
+            </a:extLst>
+          </p:cNvPr>
+          <p:cNvSpPr/>
+          <p:nvPr/>
+        </p:nvSpPr>
+        <p:spPr>
+          <a:xfrm>
+            <a:off x="6646179" y="4304589"/>
+            <a:ext cx="2335896" cy="369332"/>
+          </a:xfrm>
+          <a:prstGeom prst="rect">
+            <a:avLst/>
+          </a:prstGeom>
+        </p:spPr>
+        <p:txBody>
+          <a:bodyPr wrap="none">
+            <a:spAutoFit/>
+          </a:bodyPr>
+          <a:lstStyle/>
+          <a:p>
+            <a:r>
+              <a:rPr lang="en-US" dirty="0">
+                <a:solidFill>
+                  <a:schemeClr val="bg1"/>
+                </a:solidFill>
+                <a:latin typeface="Candara" panose="020E0502030303020204" pitchFamily="34" charset="0"/>
+              </a:rPr>
+              <a:t>https://xkcd.com/2110/</a:t>
+            </a:r>
+          </a:p>
+        </p:txBody>
+      </p:sp>
+    </p:spTree>
+    <p:extLst>
+      <p:ext uri="{BB962C8B-B14F-4D97-AF65-F5344CB8AC3E}">
+        <p14:creationId xmlns:p14="http://schemas.microsoft.com/office/powerpoint/2010/main" val="3604707865"/>
+      </p:ext>
+    </p:extLst>
+  </p:cSld>
+  <p:clrMapOvr>
+    <a:masterClrMapping/>
+  </p:clrMapOvr>
+</p:sld>
+</file>
+
+<file path=ppt/slides/slide20.xml><?xml version="1.0" encoding="utf-8"?>
 <p:sld xmlns:a="http://schemas.openxmlformats.org/drawingml/2006/main" xmlns:r="http://schemas.openxmlformats.org/officeDocument/2006/relationships" xmlns:p="http://schemas.openxmlformats.org/presentationml/2006/main">
   <p:cSld>
     <p:bg>
@@ -12369,259 +12937,7 @@
 </p:sld>
 </file>
 
-<file path=ppt/slides/slide2.xml><?xml version="1.0" encoding="utf-8"?>
-<p:sld xmlns:a="http://schemas.openxmlformats.org/drawingml/2006/main" xmlns:r="http://schemas.openxmlformats.org/officeDocument/2006/relationships" xmlns:p="http://schemas.openxmlformats.org/presentationml/2006/main">
-  <p:cSld>
-    <p:bg>
-      <p:bgPr>
-        <a:solidFill>
-          <a:schemeClr val="tx1"/>
-        </a:solidFill>
-        <a:effectLst/>
-      </p:bgPr>
-    </p:bg>
-    <p:spTree>
-      <p:nvGrpSpPr>
-        <p:cNvPr id="1" name=""/>
-        <p:cNvGrpSpPr/>
-        <p:nvPr/>
-      </p:nvGrpSpPr>
-      <p:grpSpPr>
-        <a:xfrm>
-          <a:off x="0" y="0"/>
-          <a:ext cx="0" cy="0"/>
-          <a:chOff x="0" y="0"/>
-          <a:chExt cx="0" cy="0"/>
-        </a:xfrm>
-      </p:grpSpPr>
-      <p:sp>
-        <p:nvSpPr>
-          <p:cNvPr id="11" name="TextBox 10">
-            <a:extLst>
-              <a:ext uri="{FF2B5EF4-FFF2-40B4-BE49-F238E27FC236}">
-                <a16:creationId xmlns:a16="http://schemas.microsoft.com/office/drawing/2014/main" id="{94F7AF02-97E2-4C34-A6BC-ADE93CE4F163}"/>
-              </a:ext>
-            </a:extLst>
-          </p:cNvPr>
-          <p:cNvSpPr txBox="1"/>
-          <p:nvPr/>
-        </p:nvSpPr>
-        <p:spPr>
-          <a:xfrm>
-            <a:off x="9525" y="-38784"/>
-            <a:ext cx="1648208" cy="646331"/>
-          </a:xfrm>
-          <a:prstGeom prst="rect">
-            <a:avLst/>
-          </a:prstGeom>
-          <a:noFill/>
-        </p:spPr>
-        <p:txBody>
-          <a:bodyPr wrap="none" rtlCol="0">
-            <a:spAutoFit/>
-          </a:bodyPr>
-          <a:lstStyle/>
-          <a:p>
-            <a:r>
-              <a:rPr lang="en-US" sz="3600" b="1" dirty="0">
-                <a:solidFill>
-                  <a:schemeClr val="bg1"/>
-                </a:solidFill>
-                <a:latin typeface="Candara" panose="020E0502030303020204" pitchFamily="34" charset="0"/>
-              </a:rPr>
-              <a:t>Outline</a:t>
-            </a:r>
-          </a:p>
-        </p:txBody>
-      </p:sp>
-      <p:sp>
-        <p:nvSpPr>
-          <p:cNvPr id="4" name="Rectangle 3">
-            <a:extLst>
-              <a:ext uri="{FF2B5EF4-FFF2-40B4-BE49-F238E27FC236}">
-                <a16:creationId xmlns:a16="http://schemas.microsoft.com/office/drawing/2014/main" id="{5AD40034-C9A7-4F57-8AAC-4BB1F059CBD4}"/>
-              </a:ext>
-            </a:extLst>
-          </p:cNvPr>
-          <p:cNvSpPr/>
-          <p:nvPr/>
-        </p:nvSpPr>
-        <p:spPr>
-          <a:xfrm>
-            <a:off x="237303" y="4181475"/>
-            <a:ext cx="8394970" cy="2308324"/>
-          </a:xfrm>
-          <a:prstGeom prst="rect">
-            <a:avLst/>
-          </a:prstGeom>
-        </p:spPr>
-        <p:txBody>
-          <a:bodyPr wrap="square">
-            <a:spAutoFit/>
-          </a:bodyPr>
-          <a:lstStyle/>
-          <a:p>
-            <a:pPr marL="342900" indent="-342900">
-              <a:buFont typeface="Arial" panose="020B0604020202020204" pitchFamily="34" charset="0"/>
-              <a:buChar char="•"/>
-            </a:pPr>
-            <a:r>
-              <a:rPr lang="en-US" sz="3600" dirty="0">
-                <a:solidFill>
-                  <a:schemeClr val="bg1"/>
-                </a:solidFill>
-                <a:latin typeface="Candara" panose="020E0502030303020204" pitchFamily="34" charset="0"/>
-              </a:rPr>
-              <a:t>Definitions</a:t>
-            </a:r>
-          </a:p>
-          <a:p>
-            <a:pPr marL="342900" indent="-342900">
-              <a:buFont typeface="Arial" panose="020B0604020202020204" pitchFamily="34" charset="0"/>
-              <a:buChar char="•"/>
-            </a:pPr>
-            <a:r>
-              <a:rPr lang="en-US" sz="3600" dirty="0">
-                <a:solidFill>
-                  <a:schemeClr val="bg1"/>
-                </a:solidFill>
-                <a:latin typeface="Candara" panose="020E0502030303020204" pitchFamily="34" charset="0"/>
-              </a:rPr>
-              <a:t>Bias—Variance Compromise</a:t>
-            </a:r>
-          </a:p>
-          <a:p>
-            <a:pPr marL="342900" indent="-342900">
-              <a:buFont typeface="Arial" panose="020B0604020202020204" pitchFamily="34" charset="0"/>
-              <a:buChar char="•"/>
-            </a:pPr>
-            <a:r>
-              <a:rPr lang="en-US" sz="3600" dirty="0">
-                <a:solidFill>
-                  <a:schemeClr val="bg1"/>
-                </a:solidFill>
-                <a:latin typeface="Candara" panose="020E0502030303020204" pitchFamily="34" charset="0"/>
-              </a:rPr>
-              <a:t>Accuracy / Validation</a:t>
-            </a:r>
-          </a:p>
-          <a:p>
-            <a:pPr marL="342900" indent="-342900">
-              <a:buFont typeface="Arial" panose="020B0604020202020204" pitchFamily="34" charset="0"/>
-              <a:buChar char="•"/>
-            </a:pPr>
-            <a:r>
-              <a:rPr lang="en-US" sz="3600" dirty="0">
-                <a:solidFill>
-                  <a:schemeClr val="bg1"/>
-                </a:solidFill>
-                <a:latin typeface="Candara" panose="020E0502030303020204" pitchFamily="34" charset="0"/>
-              </a:rPr>
-              <a:t>Uncertainty</a:t>
-            </a:r>
-          </a:p>
-        </p:txBody>
-      </p:sp>
-      <p:pic>
-        <p:nvPicPr>
-          <p:cNvPr id="5" name="Picture 2" descr="Error Bars">
-            <a:extLst>
-              <a:ext uri="{FF2B5EF4-FFF2-40B4-BE49-F238E27FC236}">
-                <a16:creationId xmlns:a16="http://schemas.microsoft.com/office/drawing/2014/main" id="{EF1CAD1F-AD85-4639-9029-D5D07AF45FB3}"/>
-              </a:ext>
-            </a:extLst>
-          </p:cNvPr>
-          <p:cNvPicPr>
-            <a:picLocks noChangeAspect="1" noChangeArrowheads="1"/>
-          </p:cNvPicPr>
-          <p:nvPr/>
-        </p:nvPicPr>
-        <p:blipFill>
-          <a:blip r:embed="rId3">
-            <a:extLst>
-              <a:ext uri="{28A0092B-C50C-407E-A947-70E740481C1C}">
-                <a14:useLocalDpi xmlns:a14="http://schemas.microsoft.com/office/drawing/2010/main" val="0"/>
-              </a:ext>
-            </a:extLst>
-          </a:blip>
-          <a:srcRect/>
-          <a:stretch>
-            <a:fillRect/>
-          </a:stretch>
-        </p:blipFill>
-        <p:spPr bwMode="auto">
-          <a:xfrm>
-            <a:off x="4628405" y="215972"/>
-            <a:ext cx="4259732" cy="4069567"/>
-          </a:xfrm>
-          <a:prstGeom prst="rect">
-            <a:avLst/>
-          </a:prstGeom>
-          <a:noFill/>
-          <a:extLst>
-            <a:ext uri="{909E8E84-426E-40DD-AFC4-6F175D3DCCD1}">
-              <a14:hiddenFill xmlns:a14="http://schemas.microsoft.com/office/drawing/2010/main">
-                <a:solidFill>
-                  <a:srgbClr val="FFFFFF"/>
-                </a:solidFill>
-              </a14:hiddenFill>
-            </a:ext>
-          </a:extLst>
-        </p:spPr>
-      </p:pic>
-      <p:sp>
-        <p:nvSpPr>
-          <p:cNvPr id="6" name="Rectangle 5">
-            <a:extLst>
-              <a:ext uri="{FF2B5EF4-FFF2-40B4-BE49-F238E27FC236}">
-                <a16:creationId xmlns:a16="http://schemas.microsoft.com/office/drawing/2014/main" id="{8A3AA20C-ADAE-40F3-B8D3-D02E93A4010C}"/>
-              </a:ext>
-            </a:extLst>
-          </p:cNvPr>
-          <p:cNvSpPr/>
-          <p:nvPr/>
-        </p:nvSpPr>
-        <p:spPr>
-          <a:xfrm>
-            <a:off x="6646179" y="4304589"/>
-            <a:ext cx="2335896" cy="369332"/>
-          </a:xfrm>
-          <a:prstGeom prst="rect">
-            <a:avLst/>
-          </a:prstGeom>
-        </p:spPr>
-        <p:txBody>
-          <a:bodyPr wrap="none">
-            <a:spAutoFit/>
-          </a:bodyPr>
-          <a:lstStyle/>
-          <a:p>
-            <a:r>
-              <a:rPr lang="en-US" dirty="0">
-                <a:solidFill>
-                  <a:schemeClr val="bg1"/>
-                </a:solidFill>
-                <a:latin typeface="Candara" panose="020E0502030303020204" pitchFamily="34" charset="0"/>
-              </a:rPr>
-              <a:t>https://xkcd.com/2110/</a:t>
-            </a:r>
-          </a:p>
-        </p:txBody>
-      </p:sp>
-    </p:spTree>
-    <p:extLst>
-      <p:ext uri="{BB962C8B-B14F-4D97-AF65-F5344CB8AC3E}">
-        <p14:creationId xmlns:p14="http://schemas.microsoft.com/office/powerpoint/2010/main" val="3604707865"/>
-      </p:ext>
-    </p:extLst>
-  </p:cSld>
-  <p:clrMapOvr>
-    <a:masterClrMapping/>
-  </p:clrMapOvr>
-</p:sld>
-</file>
-
-<file path=ppt/slides/slide20.xml><?xml version="1.0" encoding="utf-8"?>
+<file path=ppt/slides/slide21.xml><?xml version="1.0" encoding="utf-8"?>
 <p:sld xmlns:a="http://schemas.openxmlformats.org/drawingml/2006/main" xmlns:r="http://schemas.openxmlformats.org/officeDocument/2006/relationships" xmlns:p="http://schemas.openxmlformats.org/presentationml/2006/main">
   <p:cSld>
     <p:bg>
@@ -13132,7 +13448,7 @@
 </p:sld>
 </file>
 
-<file path=ppt/slides/slide21.xml><?xml version="1.0" encoding="utf-8"?>
+<file path=ppt/slides/slide22.xml><?xml version="1.0" encoding="utf-8"?>
 <p:sld xmlns:a="http://schemas.openxmlformats.org/drawingml/2006/main" xmlns:r="http://schemas.openxmlformats.org/officeDocument/2006/relationships" xmlns:p="http://schemas.openxmlformats.org/presentationml/2006/main">
   <p:cSld>
     <p:bg>
@@ -13295,7 +13611,7 @@
 </p:sld>
 </file>
 
-<file path=ppt/slides/slide22.xml><?xml version="1.0" encoding="utf-8"?>
+<file path=ppt/slides/slide23.xml><?xml version="1.0" encoding="utf-8"?>
 <p:sld xmlns:a="http://schemas.openxmlformats.org/drawingml/2006/main" xmlns:r="http://schemas.openxmlformats.org/officeDocument/2006/relationships" xmlns:p="http://schemas.openxmlformats.org/presentationml/2006/main">
   <p:cSld>
     <p:bg>
@@ -13485,7 +13801,7 @@
 </p:sld>
 </file>
 
-<file path=ppt/slides/slide23.xml><?xml version="1.0" encoding="utf-8"?>
+<file path=ppt/slides/slide24.xml><?xml version="1.0" encoding="utf-8"?>
 <p:sld xmlns:a="http://schemas.openxmlformats.org/drawingml/2006/main" xmlns:r="http://schemas.openxmlformats.org/officeDocument/2006/relationships" xmlns:p="http://schemas.openxmlformats.org/presentationml/2006/main">
   <p:cSld>
     <p:bg>
@@ -14035,7 +14351,7 @@
 </p:sld>
 </file>
 
-<file path=ppt/slides/slide24.xml><?xml version="1.0" encoding="utf-8"?>
+<file path=ppt/slides/slide25.xml><?xml version="1.0" encoding="utf-8"?>
 <p:sld xmlns:a="http://schemas.openxmlformats.org/drawingml/2006/main" xmlns:r="http://schemas.openxmlformats.org/officeDocument/2006/relationships" xmlns:p="http://schemas.openxmlformats.org/presentationml/2006/main">
   <p:cSld>
     <p:bg>
@@ -14113,7 +14429,7 @@
 </p:sld>
 </file>
 
-<file path=ppt/slides/slide25.xml><?xml version="1.0" encoding="utf-8"?>
+<file path=ppt/slides/slide26.xml><?xml version="1.0" encoding="utf-8"?>
 <p:sld xmlns:a="http://schemas.openxmlformats.org/drawingml/2006/main" xmlns:r="http://schemas.openxmlformats.org/officeDocument/2006/relationships" xmlns:p="http://schemas.openxmlformats.org/presentationml/2006/main">
   <p:cSld>
     <p:bg>
@@ -14472,7 +14788,7 @@
 </p:sld>
 </file>
 
-<file path=ppt/slides/slide26.xml><?xml version="1.0" encoding="utf-8"?>
+<file path=ppt/slides/slide27.xml><?xml version="1.0" encoding="utf-8"?>
 <p:sld xmlns:a="http://schemas.openxmlformats.org/drawingml/2006/main" xmlns:r="http://schemas.openxmlformats.org/officeDocument/2006/relationships" xmlns:p="http://schemas.openxmlformats.org/presentationml/2006/main">
   <p:cSld>
     <p:bg>
@@ -14777,7 +15093,7 @@
 </p:sld>
 </file>
 
-<file path=ppt/slides/slide27.xml><?xml version="1.0" encoding="utf-8"?>
+<file path=ppt/slides/slide28.xml><?xml version="1.0" encoding="utf-8"?>
 <p:sld xmlns:a="http://schemas.openxmlformats.org/drawingml/2006/main" xmlns:r="http://schemas.openxmlformats.org/officeDocument/2006/relationships" xmlns:p="http://schemas.openxmlformats.org/presentationml/2006/main">
   <p:cSld>
     <p:bg>
@@ -14932,7 +15248,7 @@
 </p:sld>
 </file>
 
-<file path=ppt/slides/slide28.xml><?xml version="1.0" encoding="utf-8"?>
+<file path=ppt/slides/slide29.xml><?xml version="1.0" encoding="utf-8"?>
 <p:sld xmlns:a="http://schemas.openxmlformats.org/drawingml/2006/main" xmlns:r="http://schemas.openxmlformats.org/officeDocument/2006/relationships" xmlns:p="http://schemas.openxmlformats.org/presentationml/2006/main">
   <p:cSld>
     <p:bg>
@@ -15698,7 +16014,261 @@
 </p:sld>
 </file>
 
-<file path=ppt/slides/slide29.xml><?xml version="1.0" encoding="utf-8"?>
+<file path=ppt/slides/slide3.xml><?xml version="1.0" encoding="utf-8"?>
+<p:sld xmlns:a="http://schemas.openxmlformats.org/drawingml/2006/main" xmlns:r="http://schemas.openxmlformats.org/officeDocument/2006/relationships" xmlns:p="http://schemas.openxmlformats.org/presentationml/2006/main">
+  <p:cSld>
+    <p:spTree>
+      <p:nvGrpSpPr>
+        <p:cNvPr id="1" name=""/>
+        <p:cNvGrpSpPr/>
+        <p:nvPr/>
+      </p:nvGrpSpPr>
+      <p:grpSpPr>
+        <a:xfrm>
+          <a:off x="0" y="0"/>
+          <a:ext cx="0" cy="0"/>
+          <a:chOff x="0" y="0"/>
+          <a:chExt cx="0" cy="0"/>
+        </a:xfrm>
+      </p:grpSpPr>
+      <p:sp>
+        <p:nvSpPr>
+          <p:cNvPr id="2" name="Title 1"/>
+          <p:cNvSpPr>
+            <a:spLocks noGrp="1"/>
+          </p:cNvSpPr>
+          <p:nvPr>
+            <p:ph type="title"/>
+          </p:nvPr>
+        </p:nvSpPr>
+        <p:spPr>
+          <a:xfrm>
+            <a:off x="465513" y="365126"/>
+            <a:ext cx="8162553" cy="1325563"/>
+          </a:xfrm>
+        </p:spPr>
+        <p:txBody>
+          <a:bodyPr>
+            <a:normAutofit/>
+          </a:bodyPr>
+          <a:lstStyle/>
+          <a:p>
+            <a:pPr algn="ctr"/>
+            <a:r>
+              <a:rPr lang="en-US" sz="4000" dirty="0"/>
+              <a:t>Precision vs. Accuracy vs. Uncertainty</a:t>
+            </a:r>
+          </a:p>
+        </p:txBody>
+      </p:sp>
+      <p:sp>
+        <p:nvSpPr>
+          <p:cNvPr id="5" name="Rectangle 4"/>
+          <p:cNvSpPr/>
+          <p:nvPr/>
+        </p:nvSpPr>
+        <p:spPr>
+          <a:xfrm>
+            <a:off x="4541841" y="5863235"/>
+            <a:ext cx="4572000" cy="923330"/>
+          </a:xfrm>
+          <a:prstGeom prst="rect">
+            <a:avLst/>
+          </a:prstGeom>
+        </p:spPr>
+        <p:txBody>
+          <a:bodyPr>
+            <a:spAutoFit/>
+          </a:bodyPr>
+          <a:lstStyle/>
+          <a:p>
+            <a:r>
+              <a:rPr lang="en-US" u="sng" dirty="0"/>
+              <a:t>Uncertainty</a:t>
+            </a:r>
+            <a:r>
+              <a:rPr lang="en-US" dirty="0"/>
+              <a:t>: The </a:t>
+            </a:r>
+            <a:r>
+              <a:rPr lang="en-US" i="1" dirty="0"/>
+              <a:t>estimated</a:t>
+            </a:r>
+            <a:r>
+              <a:rPr lang="en-US" dirty="0"/>
+              <a:t> amount or percentage by which an observed or calculated value may differ from the true value</a:t>
+            </a:r>
+          </a:p>
+        </p:txBody>
+      </p:sp>
+      <p:sp>
+        <p:nvSpPr>
+          <p:cNvPr id="6" name="Rectangle 5"/>
+          <p:cNvSpPr/>
+          <p:nvPr/>
+        </p:nvSpPr>
+        <p:spPr>
+          <a:xfrm>
+            <a:off x="4541841" y="3188365"/>
+            <a:ext cx="4572000" cy="923330"/>
+          </a:xfrm>
+          <a:prstGeom prst="rect">
+            <a:avLst/>
+          </a:prstGeom>
+        </p:spPr>
+        <p:txBody>
+          <a:bodyPr>
+            <a:spAutoFit/>
+          </a:bodyPr>
+          <a:lstStyle/>
+          <a:p>
+            <a:r>
+              <a:rPr lang="en-US" u="sng" dirty="0"/>
+              <a:t>Accuracy:</a:t>
+            </a:r>
+            <a:r>
+              <a:rPr lang="en-US" dirty="0"/>
+              <a:t> The ability of a measurement to match the actual value of the quantity being measured</a:t>
+            </a:r>
+          </a:p>
+        </p:txBody>
+      </p:sp>
+      <p:sp>
+        <p:nvSpPr>
+          <p:cNvPr id="7" name="Rectangle 6"/>
+          <p:cNvSpPr/>
+          <p:nvPr/>
+        </p:nvSpPr>
+        <p:spPr>
+          <a:xfrm>
+            <a:off x="4541841" y="2425664"/>
+            <a:ext cx="4572000" cy="646331"/>
+          </a:xfrm>
+          <a:prstGeom prst="rect">
+            <a:avLst/>
+          </a:prstGeom>
+        </p:spPr>
+        <p:txBody>
+          <a:bodyPr>
+            <a:spAutoFit/>
+          </a:bodyPr>
+          <a:lstStyle/>
+          <a:p>
+            <a:r>
+              <a:rPr lang="en-US" u="sng" dirty="0"/>
+              <a:t>Precision</a:t>
+            </a:r>
+            <a:r>
+              <a:rPr lang="en-US" dirty="0"/>
+              <a:t>: The ability of a measurement to be consistently reproduced</a:t>
+            </a:r>
+          </a:p>
+        </p:txBody>
+      </p:sp>
+      <p:sp>
+        <p:nvSpPr>
+          <p:cNvPr id="3" name="TextBox 2"/>
+          <p:cNvSpPr txBox="1"/>
+          <p:nvPr/>
+        </p:nvSpPr>
+        <p:spPr>
+          <a:xfrm>
+            <a:off x="4804756" y="1899652"/>
+            <a:ext cx="3823310" cy="523220"/>
+          </a:xfrm>
+          <a:prstGeom prst="rect">
+            <a:avLst/>
+          </a:prstGeom>
+          <a:noFill/>
+        </p:spPr>
+        <p:txBody>
+          <a:bodyPr wrap="square" rtlCol="0">
+            <a:spAutoFit/>
+          </a:bodyPr>
+          <a:lstStyle/>
+          <a:p>
+            <a:pPr algn="ctr"/>
+            <a:r>
+              <a:rPr lang="en-US" sz="2800" b="1" dirty="0"/>
+              <a:t>Measurements (Errors)</a:t>
+            </a:r>
+          </a:p>
+        </p:txBody>
+      </p:sp>
+      <p:sp>
+        <p:nvSpPr>
+          <p:cNvPr id="114" name="TextBox 113"/>
+          <p:cNvSpPr txBox="1"/>
+          <p:nvPr/>
+        </p:nvSpPr>
+        <p:spPr>
+          <a:xfrm>
+            <a:off x="4673299" y="5377190"/>
+            <a:ext cx="4086224" cy="523220"/>
+          </a:xfrm>
+          <a:prstGeom prst="rect">
+            <a:avLst/>
+          </a:prstGeom>
+          <a:noFill/>
+        </p:spPr>
+        <p:txBody>
+          <a:bodyPr wrap="square" rtlCol="0">
+            <a:spAutoFit/>
+          </a:bodyPr>
+          <a:lstStyle/>
+          <a:p>
+            <a:pPr algn="ctr"/>
+            <a:r>
+              <a:rPr lang="en-US" sz="2800" b="1" dirty="0"/>
+              <a:t>Modeling (Uncertainty)</a:t>
+            </a:r>
+          </a:p>
+        </p:txBody>
+      </p:sp>
+      <p:pic>
+        <p:nvPicPr>
+          <p:cNvPr id="9" name="Content Placeholder 3"/>
+          <p:cNvPicPr>
+            <a:picLocks noChangeAspect="1"/>
+          </p:cNvPicPr>
+          <p:nvPr/>
+        </p:nvPicPr>
+        <p:blipFill>
+          <a:blip r:embed="rId3" cstate="print">
+            <a:extLst>
+              <a:ext uri="{28A0092B-C50C-407E-A947-70E740481C1C}">
+                <a14:useLocalDpi xmlns:a14="http://schemas.microsoft.com/office/drawing/2010/main"/>
+              </a:ext>
+            </a:extLst>
+          </a:blip>
+          <a:stretch>
+            <a:fillRect/>
+          </a:stretch>
+        </p:blipFill>
+        <p:spPr>
+          <a:xfrm>
+            <a:off x="0" y="2501875"/>
+            <a:ext cx="5791200" cy="3118338"/>
+          </a:xfrm>
+          <a:prstGeom prst="rect">
+            <a:avLst/>
+          </a:prstGeom>
+        </p:spPr>
+      </p:pic>
+    </p:spTree>
+    <p:extLst>
+      <p:ext uri="{BB962C8B-B14F-4D97-AF65-F5344CB8AC3E}">
+        <p14:creationId xmlns:p14="http://schemas.microsoft.com/office/powerpoint/2010/main" val="1218573069"/>
+      </p:ext>
+    </p:extLst>
+  </p:cSld>
+  <p:clrMapOvr>
+    <a:masterClrMapping/>
+  </p:clrMapOvr>
+</p:sld>
+</file>
+
+<file path=ppt/slides/slide30.xml><?xml version="1.0" encoding="utf-8"?>
 <p:sld xmlns:a="http://schemas.openxmlformats.org/drawingml/2006/main" xmlns:r="http://schemas.openxmlformats.org/officeDocument/2006/relationships" xmlns:p="http://schemas.openxmlformats.org/presentationml/2006/main">
   <p:cSld>
     <p:bg>
@@ -16352,261 +16922,7 @@
 </p:sld>
 </file>
 
-<file path=ppt/slides/slide3.xml><?xml version="1.0" encoding="utf-8"?>
-<p:sld xmlns:a="http://schemas.openxmlformats.org/drawingml/2006/main" xmlns:r="http://schemas.openxmlformats.org/officeDocument/2006/relationships" xmlns:p="http://schemas.openxmlformats.org/presentationml/2006/main">
-  <p:cSld>
-    <p:spTree>
-      <p:nvGrpSpPr>
-        <p:cNvPr id="1" name=""/>
-        <p:cNvGrpSpPr/>
-        <p:nvPr/>
-      </p:nvGrpSpPr>
-      <p:grpSpPr>
-        <a:xfrm>
-          <a:off x="0" y="0"/>
-          <a:ext cx="0" cy="0"/>
-          <a:chOff x="0" y="0"/>
-          <a:chExt cx="0" cy="0"/>
-        </a:xfrm>
-      </p:grpSpPr>
-      <p:sp>
-        <p:nvSpPr>
-          <p:cNvPr id="2" name="Title 1"/>
-          <p:cNvSpPr>
-            <a:spLocks noGrp="1"/>
-          </p:cNvSpPr>
-          <p:nvPr>
-            <p:ph type="title"/>
-          </p:nvPr>
-        </p:nvSpPr>
-        <p:spPr>
-          <a:xfrm>
-            <a:off x="465513" y="365126"/>
-            <a:ext cx="8162553" cy="1325563"/>
-          </a:xfrm>
-        </p:spPr>
-        <p:txBody>
-          <a:bodyPr>
-            <a:normAutofit/>
-          </a:bodyPr>
-          <a:lstStyle/>
-          <a:p>
-            <a:pPr algn="ctr"/>
-            <a:r>
-              <a:rPr lang="en-US" sz="4000" dirty="0"/>
-              <a:t>Precision vs. Accuracy vs. Uncertainty</a:t>
-            </a:r>
-          </a:p>
-        </p:txBody>
-      </p:sp>
-      <p:sp>
-        <p:nvSpPr>
-          <p:cNvPr id="5" name="Rectangle 4"/>
-          <p:cNvSpPr/>
-          <p:nvPr/>
-        </p:nvSpPr>
-        <p:spPr>
-          <a:xfrm>
-            <a:off x="4541841" y="5863235"/>
-            <a:ext cx="4572000" cy="923330"/>
-          </a:xfrm>
-          <a:prstGeom prst="rect">
-            <a:avLst/>
-          </a:prstGeom>
-        </p:spPr>
-        <p:txBody>
-          <a:bodyPr>
-            <a:spAutoFit/>
-          </a:bodyPr>
-          <a:lstStyle/>
-          <a:p>
-            <a:r>
-              <a:rPr lang="en-US" u="sng" dirty="0"/>
-              <a:t>Uncertainty</a:t>
-            </a:r>
-            <a:r>
-              <a:rPr lang="en-US" dirty="0"/>
-              <a:t>: The </a:t>
-            </a:r>
-            <a:r>
-              <a:rPr lang="en-US" i="1" dirty="0"/>
-              <a:t>estimated</a:t>
-            </a:r>
-            <a:r>
-              <a:rPr lang="en-US" dirty="0"/>
-              <a:t> amount or percentage by which an observed or calculated value may differ from the true value</a:t>
-            </a:r>
-          </a:p>
-        </p:txBody>
-      </p:sp>
-      <p:sp>
-        <p:nvSpPr>
-          <p:cNvPr id="6" name="Rectangle 5"/>
-          <p:cNvSpPr/>
-          <p:nvPr/>
-        </p:nvSpPr>
-        <p:spPr>
-          <a:xfrm>
-            <a:off x="4541841" y="3188365"/>
-            <a:ext cx="4572000" cy="923330"/>
-          </a:xfrm>
-          <a:prstGeom prst="rect">
-            <a:avLst/>
-          </a:prstGeom>
-        </p:spPr>
-        <p:txBody>
-          <a:bodyPr>
-            <a:spAutoFit/>
-          </a:bodyPr>
-          <a:lstStyle/>
-          <a:p>
-            <a:r>
-              <a:rPr lang="en-US" u="sng" dirty="0"/>
-              <a:t>Accuracy:</a:t>
-            </a:r>
-            <a:r>
-              <a:rPr lang="en-US" dirty="0"/>
-              <a:t> The ability of a measurement to match the actual value of the quantity being measured</a:t>
-            </a:r>
-          </a:p>
-        </p:txBody>
-      </p:sp>
-      <p:sp>
-        <p:nvSpPr>
-          <p:cNvPr id="7" name="Rectangle 6"/>
-          <p:cNvSpPr/>
-          <p:nvPr/>
-        </p:nvSpPr>
-        <p:spPr>
-          <a:xfrm>
-            <a:off x="4541841" y="2425664"/>
-            <a:ext cx="4572000" cy="646331"/>
-          </a:xfrm>
-          <a:prstGeom prst="rect">
-            <a:avLst/>
-          </a:prstGeom>
-        </p:spPr>
-        <p:txBody>
-          <a:bodyPr>
-            <a:spAutoFit/>
-          </a:bodyPr>
-          <a:lstStyle/>
-          <a:p>
-            <a:r>
-              <a:rPr lang="en-US" u="sng" dirty="0"/>
-              <a:t>Precision</a:t>
-            </a:r>
-            <a:r>
-              <a:rPr lang="en-US" dirty="0"/>
-              <a:t>: The ability of a measurement to be consistently reproduced</a:t>
-            </a:r>
-          </a:p>
-        </p:txBody>
-      </p:sp>
-      <p:sp>
-        <p:nvSpPr>
-          <p:cNvPr id="3" name="TextBox 2"/>
-          <p:cNvSpPr txBox="1"/>
-          <p:nvPr/>
-        </p:nvSpPr>
-        <p:spPr>
-          <a:xfrm>
-            <a:off x="4804756" y="1899652"/>
-            <a:ext cx="3823310" cy="523220"/>
-          </a:xfrm>
-          <a:prstGeom prst="rect">
-            <a:avLst/>
-          </a:prstGeom>
-          <a:noFill/>
-        </p:spPr>
-        <p:txBody>
-          <a:bodyPr wrap="square" rtlCol="0">
-            <a:spAutoFit/>
-          </a:bodyPr>
-          <a:lstStyle/>
-          <a:p>
-            <a:pPr algn="ctr"/>
-            <a:r>
-              <a:rPr lang="en-US" sz="2800" b="1" dirty="0"/>
-              <a:t>Measurements (Errors)</a:t>
-            </a:r>
-          </a:p>
-        </p:txBody>
-      </p:sp>
-      <p:sp>
-        <p:nvSpPr>
-          <p:cNvPr id="114" name="TextBox 113"/>
-          <p:cNvSpPr txBox="1"/>
-          <p:nvPr/>
-        </p:nvSpPr>
-        <p:spPr>
-          <a:xfrm>
-            <a:off x="4673299" y="5377190"/>
-            <a:ext cx="4086224" cy="523220"/>
-          </a:xfrm>
-          <a:prstGeom prst="rect">
-            <a:avLst/>
-          </a:prstGeom>
-          <a:noFill/>
-        </p:spPr>
-        <p:txBody>
-          <a:bodyPr wrap="square" rtlCol="0">
-            <a:spAutoFit/>
-          </a:bodyPr>
-          <a:lstStyle/>
-          <a:p>
-            <a:pPr algn="ctr"/>
-            <a:r>
-              <a:rPr lang="en-US" sz="2800" b="1" dirty="0"/>
-              <a:t>Modeling (Uncertainty)</a:t>
-            </a:r>
-          </a:p>
-        </p:txBody>
-      </p:sp>
-      <p:pic>
-        <p:nvPicPr>
-          <p:cNvPr id="9" name="Content Placeholder 3"/>
-          <p:cNvPicPr>
-            <a:picLocks noChangeAspect="1"/>
-          </p:cNvPicPr>
-          <p:nvPr/>
-        </p:nvPicPr>
-        <p:blipFill>
-          <a:blip r:embed="rId3" cstate="print">
-            <a:extLst>
-              <a:ext uri="{28A0092B-C50C-407E-A947-70E740481C1C}">
-                <a14:useLocalDpi xmlns:a14="http://schemas.microsoft.com/office/drawing/2010/main"/>
-              </a:ext>
-            </a:extLst>
-          </a:blip>
-          <a:stretch>
-            <a:fillRect/>
-          </a:stretch>
-        </p:blipFill>
-        <p:spPr>
-          <a:xfrm>
-            <a:off x="0" y="2501875"/>
-            <a:ext cx="5791200" cy="3118338"/>
-          </a:xfrm>
-          <a:prstGeom prst="rect">
-            <a:avLst/>
-          </a:prstGeom>
-        </p:spPr>
-      </p:pic>
-    </p:spTree>
-    <p:extLst>
-      <p:ext uri="{BB962C8B-B14F-4D97-AF65-F5344CB8AC3E}">
-        <p14:creationId xmlns:p14="http://schemas.microsoft.com/office/powerpoint/2010/main" val="1218573069"/>
-      </p:ext>
-    </p:extLst>
-  </p:cSld>
-  <p:clrMapOvr>
-    <a:masterClrMapping/>
-  </p:clrMapOvr>
-</p:sld>
-</file>
-
-<file path=ppt/slides/slide30.xml><?xml version="1.0" encoding="utf-8"?>
+<file path=ppt/slides/slide31.xml><?xml version="1.0" encoding="utf-8"?>
 <p:sld xmlns:a="http://schemas.openxmlformats.org/drawingml/2006/main" xmlns:r="http://schemas.openxmlformats.org/officeDocument/2006/relationships" xmlns:p="http://schemas.openxmlformats.org/presentationml/2006/main">
   <p:cSld>
     <p:bg>
@@ -17372,7 +17688,7 @@
 </p:sld>
 </file>
 
-<file path=ppt/slides/slide31.xml><?xml version="1.0" encoding="utf-8"?>
+<file path=ppt/slides/slide32.xml><?xml version="1.0" encoding="utf-8"?>
 <p:sld xmlns:a="http://schemas.openxmlformats.org/drawingml/2006/main" xmlns:r="http://schemas.openxmlformats.org/officeDocument/2006/relationships" xmlns:p="http://schemas.openxmlformats.org/presentationml/2006/main">
   <p:cSld>
     <p:bg>
@@ -18201,7 +18517,7 @@
 </p:sld>
 </file>
 
-<file path=ppt/slides/slide32.xml><?xml version="1.0" encoding="utf-8"?>
+<file path=ppt/slides/slide33.xml><?xml version="1.0" encoding="utf-8"?>
 <p:sld xmlns:a="http://schemas.openxmlformats.org/drawingml/2006/main" xmlns:r="http://schemas.openxmlformats.org/officeDocument/2006/relationships" xmlns:p="http://schemas.openxmlformats.org/presentationml/2006/main">
   <p:cSld>
     <p:bg>
@@ -18798,7 +19114,7 @@
 </p:sld>
 </file>
 
-<file path=ppt/slides/slide33.xml><?xml version="1.0" encoding="utf-8"?>
+<file path=ppt/slides/slide34.xml><?xml version="1.0" encoding="utf-8"?>
 <p:sld xmlns:a="http://schemas.openxmlformats.org/drawingml/2006/main" xmlns:r="http://schemas.openxmlformats.org/officeDocument/2006/relationships" xmlns:p="http://schemas.openxmlformats.org/presentationml/2006/main">
   <p:cSld>
     <p:bg>
@@ -18906,7 +19222,7 @@
 </p:sld>
 </file>
 
-<file path=ppt/slides/slide34.xml><?xml version="1.0" encoding="utf-8"?>
+<file path=ppt/slides/slide35.xml><?xml version="1.0" encoding="utf-8"?>
 <p:sld xmlns:a="http://schemas.openxmlformats.org/drawingml/2006/main" xmlns:r="http://schemas.openxmlformats.org/officeDocument/2006/relationships" xmlns:p="http://schemas.openxmlformats.org/presentationml/2006/main">
   <p:cSld>
     <p:bg>
@@ -20235,107 +20551,38 @@
       </p:sp>
       <p:pic>
         <p:nvPicPr>
-          <p:cNvPr id="2050" name="Picture 2" descr="Curve-Fitting">
+          <p:cNvPr id="5" name="Picture 4">
             <a:extLst>
               <a:ext uri="{FF2B5EF4-FFF2-40B4-BE49-F238E27FC236}">
-                <a16:creationId xmlns:a16="http://schemas.microsoft.com/office/drawing/2014/main" id="{3E6DFC5D-A942-4E10-998A-BE41CFB2D77D}"/>
+                <a16:creationId xmlns:a16="http://schemas.microsoft.com/office/drawing/2014/main" id="{75DE22D8-B44A-42FF-9A43-77FB363F9ABF}"/>
               </a:ext>
             </a:extLst>
           </p:cNvPr>
           <p:cNvPicPr>
-            <a:picLocks noChangeAspect="1" noChangeArrowheads="1"/>
+            <a:picLocks noChangeAspect="1"/>
           </p:cNvPicPr>
           <p:nvPr/>
         </p:nvPicPr>
         <p:blipFill>
-          <a:blip r:embed="rId3">
-            <a:extLst>
-              <a:ext uri="{28A0092B-C50C-407E-A947-70E740481C1C}">
-                <a14:useLocalDpi xmlns:a14="http://schemas.microsoft.com/office/drawing/2010/main" val="0"/>
-              </a:ext>
-            </a:extLst>
-          </a:blip>
-          <a:srcRect/>
+          <a:blip r:embed="rId3"/>
           <a:stretch>
             <a:fillRect/>
           </a:stretch>
         </p:blipFill>
-        <p:spPr bwMode="auto">
-          <a:xfrm>
-            <a:off x="2607829" y="556168"/>
-            <a:ext cx="3928341" cy="6234545"/>
-          </a:xfrm>
-          <a:prstGeom prst="rect">
-            <a:avLst/>
-          </a:prstGeom>
-          <a:noFill/>
-          <a:extLst>
-            <a:ext uri="{909E8E84-426E-40DD-AFC4-6F175D3DCCD1}">
-              <a14:hiddenFill xmlns:a14="http://schemas.microsoft.com/office/drawing/2010/main">
-                <a:solidFill>
-                  <a:srgbClr val="FFFFFF"/>
-                </a:solidFill>
-              </a14:hiddenFill>
-            </a:ext>
-          </a:extLst>
-        </p:spPr>
-      </p:pic>
-      <p:sp>
-        <p:nvSpPr>
-          <p:cNvPr id="3" name="Rectangle 2">
-            <a:extLst>
-              <a:ext uri="{FF2B5EF4-FFF2-40B4-BE49-F238E27FC236}">
-                <a16:creationId xmlns:a16="http://schemas.microsoft.com/office/drawing/2014/main" id="{E95F6645-1DB8-4A81-809F-4789160A7789}"/>
-              </a:ext>
-            </a:extLst>
-          </p:cNvPr>
-          <p:cNvSpPr/>
-          <p:nvPr/>
-        </p:nvSpPr>
         <p:spPr>
           <a:xfrm>
-            <a:off x="6701820" y="6421381"/>
-            <a:ext cx="2432654" cy="369332"/>
+            <a:off x="415637" y="901594"/>
+            <a:ext cx="8312727" cy="5054810"/>
           </a:xfrm>
           <a:prstGeom prst="rect">
             <a:avLst/>
           </a:prstGeom>
         </p:spPr>
-        <p:txBody>
-          <a:bodyPr wrap="none">
-            <a:spAutoFit/>
-          </a:bodyPr>
-          <a:lstStyle/>
-          <a:p>
-            <a:r>
-              <a:rPr lang="en-US" dirty="0">
-                <a:solidFill>
-                  <a:schemeClr val="bg1"/>
-                </a:solidFill>
-                <a:latin typeface="Candara" panose="020E0502030303020204" pitchFamily="34" charset="0"/>
-                <a:hlinkClick r:id="rId4">
-                  <a:extLst>
-                    <a:ext uri="{A12FA001-AC4F-418D-AE19-62706E023703}">
-                      <ahyp:hlinkClr xmlns:ahyp="http://schemas.microsoft.com/office/drawing/2018/hyperlinkcolor" val="tx"/>
-                    </a:ext>
-                  </a:extLst>
-                </a:hlinkClick>
-              </a:rPr>
-              <a:t>https://xkcd.com/2048/</a:t>
-            </a:r>
-            <a:endParaRPr lang="en-US" dirty="0">
-              <a:solidFill>
-                <a:schemeClr val="bg1"/>
-              </a:solidFill>
-              <a:latin typeface="Candara" panose="020E0502030303020204" pitchFamily="34" charset="0"/>
-            </a:endParaRPr>
-          </a:p>
-        </p:txBody>
-      </p:sp>
+      </p:pic>
     </p:spTree>
     <p:extLst>
       <p:ext uri="{BB962C8B-B14F-4D97-AF65-F5344CB8AC3E}">
-        <p14:creationId xmlns:p14="http://schemas.microsoft.com/office/powerpoint/2010/main" val="70866279"/>
+        <p14:creationId xmlns:p14="http://schemas.microsoft.com/office/powerpoint/2010/main" val="3724583239"/>
       </p:ext>
     </p:extLst>
   </p:cSld>

</xml_diff>